<commit_message>
added links, small tweaks
</commit_message>
<xml_diff>
--- a/slides/sassless/sassless.pptx
+++ b/slides/sassless/sassless.pptx
@@ -7,14 +7,15 @@
   <p:sldIdLst>
     <p:sldId id="256" r:id="rId2"/>
     <p:sldId id="257" r:id="rId3"/>
-    <p:sldId id="262" r:id="rId4"/>
-    <p:sldId id="258" r:id="rId5"/>
-    <p:sldId id="259" r:id="rId6"/>
-    <p:sldId id="260" r:id="rId7"/>
-    <p:sldId id="261" r:id="rId8"/>
-    <p:sldId id="263" r:id="rId9"/>
-    <p:sldId id="264" r:id="rId10"/>
-    <p:sldId id="265" r:id="rId11"/>
+    <p:sldId id="266" r:id="rId4"/>
+    <p:sldId id="262" r:id="rId5"/>
+    <p:sldId id="258" r:id="rId6"/>
+    <p:sldId id="259" r:id="rId7"/>
+    <p:sldId id="260" r:id="rId8"/>
+    <p:sldId id="261" r:id="rId9"/>
+    <p:sldId id="263" r:id="rId10"/>
+    <p:sldId id="264" r:id="rId11"/>
+    <p:sldId id="265" r:id="rId12"/>
   </p:sldIdLst>
   <p:sldSz cx="9144000" cy="6858000" type="screen4x3"/>
   <p:notesSz cx="6858000" cy="9144000"/>
@@ -3158,31 +3159,9 @@
       </p:sp>
       <p:pic>
         <p:nvPicPr>
-          <p:cNvPr id="4" name="Picture 3"/>
-          <p:cNvPicPr>
-            <a:picLocks noChangeAspect="1"/>
-          </p:cNvPicPr>
-          <p:nvPr/>
-        </p:nvPicPr>
-        <p:blipFill>
-          <a:blip r:embed="rId2"/>
-          <a:stretch>
-            <a:fillRect/>
-          </a:stretch>
-        </p:blipFill>
-        <p:spPr>
-          <a:xfrm>
-            <a:off x="1053443" y="127903"/>
-            <a:ext cx="2670029" cy="2002522"/>
-          </a:xfrm>
-          <a:prstGeom prst="rect">
-            <a:avLst/>
-          </a:prstGeom>
-        </p:spPr>
-      </p:pic>
-      <p:pic>
-        <p:nvPicPr>
-          <p:cNvPr id="5" name="Picture 4"/>
+          <p:cNvPr id="4" name="Picture 3">
+            <a:hlinkClick r:id="rId2"/>
+          </p:cNvPr>
           <p:cNvPicPr>
             <a:picLocks noChangeAspect="1"/>
           </p:cNvPicPr>
@@ -3190,6 +3169,32 @@
         </p:nvPicPr>
         <p:blipFill>
           <a:blip r:embed="rId3"/>
+          <a:stretch>
+            <a:fillRect/>
+          </a:stretch>
+        </p:blipFill>
+        <p:spPr>
+          <a:xfrm>
+            <a:off x="1053443" y="127903"/>
+            <a:ext cx="2670029" cy="2002522"/>
+          </a:xfrm>
+          <a:prstGeom prst="rect">
+            <a:avLst/>
+          </a:prstGeom>
+        </p:spPr>
+      </p:pic>
+      <p:pic>
+        <p:nvPicPr>
+          <p:cNvPr id="5" name="Picture 4">
+            <a:hlinkClick r:id="rId4"/>
+          </p:cNvPr>
+          <p:cNvPicPr>
+            <a:picLocks noChangeAspect="1"/>
+          </p:cNvPicPr>
+          <p:nvPr/>
+        </p:nvPicPr>
+        <p:blipFill>
+          <a:blip r:embed="rId5"/>
           <a:stretch>
             <a:fillRect/>
           </a:stretch>
@@ -3273,7 +3278,7 @@
         <p:spPr>
           <a:xfrm>
             <a:off x="393609" y="386210"/>
-            <a:ext cx="2337449" cy="646331"/>
+            <a:ext cx="2277712" cy="646331"/>
           </a:xfrm>
           <a:prstGeom prst="rect">
             <a:avLst/>
@@ -3290,7 +3295,7 @@
               <a:rPr lang="en-US" sz="3600" dirty="0" smtClean="0">
                 <a:latin typeface="+mj-lt"/>
               </a:rPr>
-              <a:t>SASS Usage</a:t>
+              <a:t>LESS Usage</a:t>
             </a:r>
             <a:endParaRPr lang="en-US" sz="3600" dirty="0">
               <a:latin typeface="+mj-lt"/>
@@ -3307,7 +3312,7 @@
         <p:spPr>
           <a:xfrm>
             <a:off x="861486" y="2877027"/>
-            <a:ext cx="7887048" cy="923330"/>
+            <a:ext cx="7887048" cy="1200329"/>
           </a:xfrm>
           <a:prstGeom prst="rect">
             <a:avLst/>
@@ -3322,6 +3327,420 @@
           <a:p>
             <a:r>
               <a:rPr lang="en-US" dirty="0" smtClean="0"/>
+              <a:t>During development, use </a:t>
+            </a:r>
+            <a:r>
+              <a:rPr lang="en-US" dirty="0" err="1" smtClean="0"/>
+              <a:t>less.js</a:t>
+            </a:r>
+            <a:r>
+              <a:rPr lang="en-US" dirty="0" smtClean="0"/>
+              <a:t> to compile LESS files to CSS on the client:</a:t>
+            </a:r>
+          </a:p>
+          <a:p>
+            <a:endParaRPr lang="en-US" dirty="0" smtClean="0"/>
+          </a:p>
+          <a:p>
+            <a:r>
+              <a:rPr lang="en-US" dirty="0">
+                <a:latin typeface="Courier New"/>
+                <a:cs typeface="Courier New"/>
+              </a:rPr>
+              <a:t>	</a:t>
+            </a:r>
+            <a:r>
+              <a:rPr lang="en-US" dirty="0" smtClean="0">
+                <a:latin typeface="Courier New"/>
+                <a:cs typeface="Courier New"/>
+              </a:rPr>
+              <a:t>&lt;link </a:t>
+            </a:r>
+            <a:r>
+              <a:rPr lang="en-US" dirty="0" err="1" smtClean="0">
+                <a:latin typeface="Courier New"/>
+                <a:cs typeface="Courier New"/>
+              </a:rPr>
+              <a:t>rel</a:t>
+            </a:r>
+            <a:r>
+              <a:rPr lang="en-US" dirty="0" smtClean="0">
+                <a:latin typeface="Courier New"/>
+                <a:cs typeface="Courier New"/>
+              </a:rPr>
+              <a:t>=“</a:t>
+            </a:r>
+            <a:r>
+              <a:rPr lang="en-US" dirty="0" err="1" smtClean="0">
+                <a:latin typeface="Courier New"/>
+                <a:cs typeface="Courier New"/>
+              </a:rPr>
+              <a:t>stylesheet</a:t>
+            </a:r>
+            <a:r>
+              <a:rPr lang="en-US" dirty="0" smtClean="0">
+                <a:latin typeface="Courier New"/>
+                <a:cs typeface="Courier New"/>
+              </a:rPr>
+              <a:t>/less” </a:t>
+            </a:r>
+            <a:r>
+              <a:rPr lang="en-US" dirty="0" err="1" smtClean="0">
+                <a:latin typeface="Courier New"/>
+                <a:cs typeface="Courier New"/>
+              </a:rPr>
+              <a:t>href</a:t>
+            </a:r>
+            <a:r>
+              <a:rPr lang="en-US" dirty="0" smtClean="0">
+                <a:latin typeface="Courier New"/>
+                <a:cs typeface="Courier New"/>
+              </a:rPr>
+              <a:t>=“less/</a:t>
+            </a:r>
+            <a:r>
+              <a:rPr lang="en-US" dirty="0" err="1" smtClean="0">
+                <a:latin typeface="Courier New"/>
+                <a:cs typeface="Courier New"/>
+              </a:rPr>
+              <a:t>styles.less</a:t>
+            </a:r>
+            <a:r>
+              <a:rPr lang="en-US" dirty="0" smtClean="0">
+                <a:latin typeface="Courier New"/>
+                <a:cs typeface="Courier New"/>
+              </a:rPr>
+              <a:t>”&gt;</a:t>
+            </a:r>
+          </a:p>
+          <a:p>
+            <a:r>
+              <a:rPr lang="en-US" dirty="0">
+                <a:latin typeface="Courier New"/>
+                <a:cs typeface="Courier New"/>
+              </a:rPr>
+              <a:t>	</a:t>
+            </a:r>
+            <a:r>
+              <a:rPr lang="en-US" dirty="0" smtClean="0">
+                <a:latin typeface="Courier New"/>
+                <a:cs typeface="Courier New"/>
+              </a:rPr>
+              <a:t>&lt;script </a:t>
+            </a:r>
+            <a:r>
+              <a:rPr lang="en-US" dirty="0" err="1" smtClean="0">
+                <a:latin typeface="Courier New"/>
+                <a:cs typeface="Courier New"/>
+              </a:rPr>
+              <a:t>src</a:t>
+            </a:r>
+            <a:r>
+              <a:rPr lang="en-US" dirty="0" smtClean="0">
+                <a:latin typeface="Courier New"/>
+                <a:cs typeface="Courier New"/>
+              </a:rPr>
+              <a:t>=“lib/</a:t>
+            </a:r>
+            <a:r>
+              <a:rPr lang="en-US" dirty="0" err="1" smtClean="0">
+                <a:latin typeface="Courier New"/>
+                <a:cs typeface="Courier New"/>
+              </a:rPr>
+              <a:t>less.js</a:t>
+            </a:r>
+            <a:r>
+              <a:rPr lang="en-US" dirty="0" smtClean="0">
+                <a:latin typeface="Courier New"/>
+                <a:cs typeface="Courier New"/>
+              </a:rPr>
+              <a:t>”&gt;</a:t>
+            </a:r>
+            <a:endParaRPr lang="en-US" dirty="0">
+              <a:latin typeface="Courier New"/>
+              <a:cs typeface="Courier New"/>
+            </a:endParaRPr>
+          </a:p>
+        </p:txBody>
+      </p:sp>
+      <p:sp>
+        <p:nvSpPr>
+          <p:cNvPr id="7" name="TextBox 6"/>
+          <p:cNvSpPr txBox="1"/>
+          <p:nvPr/>
+        </p:nvSpPr>
+        <p:spPr>
+          <a:xfrm>
+            <a:off x="861486" y="4616067"/>
+            <a:ext cx="7887048" cy="923330"/>
+          </a:xfrm>
+          <a:prstGeom prst="rect">
+            <a:avLst/>
+          </a:prstGeom>
+          <a:noFill/>
+        </p:spPr>
+        <p:txBody>
+          <a:bodyPr wrap="square" rtlCol="0">
+            <a:spAutoFit/>
+          </a:bodyPr>
+          <a:lstStyle/>
+          <a:p>
+            <a:r>
+              <a:rPr lang="en-US" dirty="0" smtClean="0"/>
+              <a:t>For production, use command-line compiler to make final CSS file and link to that:</a:t>
+            </a:r>
+          </a:p>
+          <a:p>
+            <a:endParaRPr lang="en-US" dirty="0" smtClean="0"/>
+          </a:p>
+          <a:p>
+            <a:r>
+              <a:rPr lang="en-US" dirty="0">
+                <a:latin typeface="Courier New"/>
+                <a:cs typeface="Courier New"/>
+              </a:rPr>
+              <a:t>	</a:t>
+            </a:r>
+            <a:r>
+              <a:rPr lang="en-US" dirty="0" err="1" smtClean="0">
+                <a:latin typeface="Courier New"/>
+                <a:cs typeface="Courier New"/>
+              </a:rPr>
+              <a:t>lessc</a:t>
+            </a:r>
+            <a:r>
+              <a:rPr lang="en-US" dirty="0" smtClean="0">
+                <a:latin typeface="Courier New"/>
+                <a:cs typeface="Courier New"/>
+              </a:rPr>
+              <a:t> less/</a:t>
+            </a:r>
+            <a:r>
+              <a:rPr lang="en-US" dirty="0" err="1" smtClean="0">
+                <a:latin typeface="Courier New"/>
+                <a:cs typeface="Courier New"/>
+              </a:rPr>
+              <a:t>styles.less</a:t>
+            </a:r>
+            <a:r>
+              <a:rPr lang="en-US" dirty="0" smtClean="0">
+                <a:latin typeface="Courier New"/>
+                <a:cs typeface="Courier New"/>
+              </a:rPr>
+              <a:t> &gt; </a:t>
+            </a:r>
+            <a:r>
+              <a:rPr lang="en-US" dirty="0" err="1" smtClean="0">
+                <a:latin typeface="Courier New"/>
+                <a:cs typeface="Courier New"/>
+              </a:rPr>
+              <a:t>css</a:t>
+            </a:r>
+            <a:r>
+              <a:rPr lang="en-US" dirty="0" smtClean="0">
+                <a:latin typeface="Courier New"/>
+                <a:cs typeface="Courier New"/>
+              </a:rPr>
+              <a:t>/</a:t>
+            </a:r>
+            <a:r>
+              <a:rPr lang="en-US" dirty="0" err="1" smtClean="0">
+                <a:latin typeface="Courier New"/>
+                <a:cs typeface="Courier New"/>
+              </a:rPr>
+              <a:t>styles.css</a:t>
+            </a:r>
+            <a:endParaRPr lang="en-US" dirty="0">
+              <a:latin typeface="Courier New"/>
+              <a:cs typeface="Courier New"/>
+            </a:endParaRPr>
+          </a:p>
+        </p:txBody>
+      </p:sp>
+      <p:sp>
+        <p:nvSpPr>
+          <p:cNvPr id="9" name="TextBox 8"/>
+          <p:cNvSpPr txBox="1"/>
+          <p:nvPr/>
+        </p:nvSpPr>
+        <p:spPr>
+          <a:xfrm>
+            <a:off x="861486" y="1414986"/>
+            <a:ext cx="7887048" cy="923330"/>
+          </a:xfrm>
+          <a:prstGeom prst="rect">
+            <a:avLst/>
+          </a:prstGeom>
+          <a:noFill/>
+        </p:spPr>
+        <p:txBody>
+          <a:bodyPr wrap="square" rtlCol="0">
+            <a:spAutoFit/>
+          </a:bodyPr>
+          <a:lstStyle/>
+          <a:p>
+            <a:r>
+              <a:rPr lang="en-US" dirty="0" smtClean="0"/>
+              <a:t>Install </a:t>
+            </a:r>
+            <a:r>
+              <a:rPr lang="en-US" dirty="0" smtClean="0">
+                <a:hlinkClick r:id="rId2"/>
+              </a:rPr>
+              <a:t>LESS</a:t>
+            </a:r>
+            <a:r>
+              <a:rPr lang="en-US" dirty="0" smtClean="0"/>
+              <a:t> using Package Manager that comes with </a:t>
+            </a:r>
+            <a:r>
+              <a:rPr lang="en-US" dirty="0" err="1" smtClean="0">
+                <a:hlinkClick r:id="rId3"/>
+              </a:rPr>
+              <a:t>Node.js</a:t>
+            </a:r>
+            <a:r>
+              <a:rPr lang="en-US" dirty="0" smtClean="0"/>
+              <a:t>:</a:t>
+            </a:r>
+          </a:p>
+          <a:p>
+            <a:endParaRPr lang="en-US" dirty="0" smtClean="0"/>
+          </a:p>
+          <a:p>
+            <a:r>
+              <a:rPr lang="en-US" dirty="0"/>
+              <a:t>	</a:t>
+            </a:r>
+            <a:r>
+              <a:rPr lang="en-US" dirty="0" err="1" smtClean="0">
+                <a:latin typeface="Courier New"/>
+                <a:cs typeface="Courier New"/>
+              </a:rPr>
+              <a:t>npm</a:t>
+            </a:r>
+            <a:r>
+              <a:rPr lang="en-US" dirty="0" smtClean="0">
+                <a:latin typeface="Courier New"/>
+                <a:cs typeface="Courier New"/>
+              </a:rPr>
+              <a:t> install -g less</a:t>
+            </a:r>
+          </a:p>
+        </p:txBody>
+      </p:sp>
+      <p:pic>
+        <p:nvPicPr>
+          <p:cNvPr id="10" name="Picture 9"/>
+          <p:cNvPicPr>
+            <a:picLocks noChangeAspect="1"/>
+          </p:cNvPicPr>
+          <p:nvPr/>
+        </p:nvPicPr>
+        <p:blipFill>
+          <a:blip r:embed="rId4"/>
+          <a:stretch>
+            <a:fillRect/>
+          </a:stretch>
+        </p:blipFill>
+        <p:spPr>
+          <a:xfrm>
+            <a:off x="6988430" y="243851"/>
+            <a:ext cx="1937647" cy="788690"/>
+          </a:xfrm>
+          <a:prstGeom prst="rect">
+            <a:avLst/>
+          </a:prstGeom>
+        </p:spPr>
+      </p:pic>
+    </p:spTree>
+    <p:extLst>
+      <p:ext uri="{BB962C8B-B14F-4D97-AF65-F5344CB8AC3E}">
+        <p14:creationId xmlns:p14="http://schemas.microsoft.com/office/powerpoint/2010/main" val="724969565"/>
+      </p:ext>
+    </p:extLst>
+  </p:cSld>
+  <p:clrMapOvr>
+    <a:masterClrMapping/>
+  </p:clrMapOvr>
+</p:sld>
+</file>
+
+<file path=ppt/slides/slide11.xml><?xml version="1.0" encoding="utf-8"?>
+<p:sld xmlns:a="http://schemas.openxmlformats.org/drawingml/2006/main" xmlns:r="http://schemas.openxmlformats.org/officeDocument/2006/relationships" xmlns:p="http://schemas.openxmlformats.org/presentationml/2006/main">
+  <p:cSld>
+    <p:spTree>
+      <p:nvGrpSpPr>
+        <p:cNvPr id="1" name=""/>
+        <p:cNvGrpSpPr/>
+        <p:nvPr/>
+      </p:nvGrpSpPr>
+      <p:grpSpPr>
+        <a:xfrm>
+          <a:off x="0" y="0"/>
+          <a:ext cx="0" cy="0"/>
+          <a:chOff x="0" y="0"/>
+          <a:chExt cx="0" cy="0"/>
+        </a:xfrm>
+      </p:grpSpPr>
+      <p:sp>
+        <p:nvSpPr>
+          <p:cNvPr id="4" name="TextBox 3"/>
+          <p:cNvSpPr txBox="1"/>
+          <p:nvPr/>
+        </p:nvSpPr>
+        <p:spPr>
+          <a:xfrm>
+            <a:off x="393609" y="386210"/>
+            <a:ext cx="2337449" cy="646331"/>
+          </a:xfrm>
+          <a:prstGeom prst="rect">
+            <a:avLst/>
+          </a:prstGeom>
+          <a:noFill/>
+        </p:spPr>
+        <p:txBody>
+          <a:bodyPr wrap="none" rtlCol="0">
+            <a:spAutoFit/>
+          </a:bodyPr>
+          <a:lstStyle/>
+          <a:p>
+            <a:r>
+              <a:rPr lang="en-US" sz="3600" dirty="0" smtClean="0">
+                <a:latin typeface="+mj-lt"/>
+              </a:rPr>
+              <a:t>SASS Usage</a:t>
+            </a:r>
+            <a:endParaRPr lang="en-US" sz="3600" dirty="0">
+              <a:latin typeface="+mj-lt"/>
+            </a:endParaRPr>
+          </a:p>
+        </p:txBody>
+      </p:sp>
+      <p:sp>
+        <p:nvSpPr>
+          <p:cNvPr id="2" name="TextBox 1"/>
+          <p:cNvSpPr txBox="1"/>
+          <p:nvPr/>
+        </p:nvSpPr>
+        <p:spPr>
+          <a:xfrm>
+            <a:off x="861486" y="2877027"/>
+            <a:ext cx="7887048" cy="923330"/>
+          </a:xfrm>
+          <a:prstGeom prst="rect">
+            <a:avLst/>
+          </a:prstGeom>
+          <a:noFill/>
+        </p:spPr>
+        <p:txBody>
+          <a:bodyPr wrap="square" rtlCol="0">
+            <a:spAutoFit/>
+          </a:bodyPr>
+          <a:lstStyle/>
+          <a:p>
+            <a:r>
+              <a:rPr lang="en-US" dirty="0" smtClean="0"/>
               <a:t>Use command-line compiler to make CSS file:</a:t>
             </a:r>
           </a:p>
@@ -3490,18 +3909,29 @@
           <a:p>
             <a:r>
               <a:rPr lang="en-US" dirty="0" smtClean="0"/>
-              <a:t>Install SASS using </a:t>
+              <a:t>Install </a:t>
             </a:r>
             <a:r>
               <a:rPr lang="en-US" dirty="0" smtClean="0">
                 <a:hlinkClick r:id="rId2"/>
               </a:rPr>
+              <a:t>SASS</a:t>
+            </a:r>
+            <a:r>
+              <a:rPr lang="en-US" dirty="0" smtClean="0"/>
+              <a:t> using </a:t>
+            </a:r>
+            <a:r>
+              <a:rPr lang="en-US" dirty="0" smtClean="0">
+                <a:hlinkClick r:id="rId3"/>
+              </a:rPr>
               <a:t>Ruby</a:t>
             </a:r>
             <a:r>
               <a:rPr lang="en-US" dirty="0" smtClean="0"/>
-              <a:t> (already on Mac)</a:t>
-            </a:r>
+              <a:t>:</a:t>
+            </a:r>
+            <a:endParaRPr lang="en-US" dirty="0" smtClean="0"/>
           </a:p>
           <a:p>
             <a:endParaRPr lang="en-US" dirty="0" smtClean="0"/>
@@ -3540,7 +3970,7 @@
           <p:nvPr/>
         </p:nvPicPr>
         <p:blipFill>
-          <a:blip r:embed="rId3"/>
+          <a:blip r:embed="rId4"/>
           <a:stretch>
             <a:fillRect/>
           </a:stretch>
@@ -3775,14 +4205,223 @@
       </p:grpSpPr>
       <p:sp>
         <p:nvSpPr>
-          <p:cNvPr id="4" name="TextBox 3"/>
+          <p:cNvPr id="2" name="Folded Corner 1"/>
+          <p:cNvSpPr/>
+          <p:nvPr/>
+        </p:nvSpPr>
+        <p:spPr>
+          <a:xfrm>
+            <a:off x="274784" y="2057307"/>
+            <a:ext cx="1559585" cy="2205849"/>
+          </a:xfrm>
+          <a:prstGeom prst="foldedCorner">
+            <a:avLst/>
+          </a:prstGeom>
+        </p:spPr>
+        <p:style>
+          <a:lnRef idx="1">
+            <a:schemeClr val="accent1"/>
+          </a:lnRef>
+          <a:fillRef idx="3">
+            <a:schemeClr val="accent1"/>
+          </a:fillRef>
+          <a:effectRef idx="2">
+            <a:schemeClr val="accent1"/>
+          </a:effectRef>
+          <a:fontRef idx="minor">
+            <a:schemeClr val="lt1"/>
+          </a:fontRef>
+        </p:style>
+        <p:txBody>
+          <a:bodyPr rtlCol="0" anchor="ctr"/>
+          <a:lstStyle/>
+          <a:p>
+            <a:pPr algn="ctr"/>
+            <a:r>
+              <a:rPr lang="en-US" dirty="0" err="1" smtClean="0"/>
+              <a:t>styles.less</a:t>
+            </a:r>
+            <a:endParaRPr lang="en-US" dirty="0"/>
+          </a:p>
+        </p:txBody>
+      </p:sp>
+      <p:sp>
+        <p:nvSpPr>
+          <p:cNvPr id="3" name="Rectangle 2"/>
+          <p:cNvSpPr/>
+          <p:nvPr/>
+        </p:nvSpPr>
+        <p:spPr>
+          <a:xfrm>
+            <a:off x="3557340" y="2057307"/>
+            <a:ext cx="2020035" cy="2287547"/>
+          </a:xfrm>
+          <a:prstGeom prst="rect">
+            <a:avLst/>
+          </a:prstGeom>
+        </p:spPr>
+        <p:style>
+          <a:lnRef idx="1">
+            <a:schemeClr val="accent1"/>
+          </a:lnRef>
+          <a:fillRef idx="3">
+            <a:schemeClr val="accent1"/>
+          </a:fillRef>
+          <a:effectRef idx="2">
+            <a:schemeClr val="accent1"/>
+          </a:effectRef>
+          <a:fontRef idx="minor">
+            <a:schemeClr val="lt1"/>
+          </a:fontRef>
+        </p:style>
+        <p:txBody>
+          <a:bodyPr rtlCol="0" anchor="ctr"/>
+          <a:lstStyle/>
+          <a:p>
+            <a:pPr algn="ctr"/>
+            <a:r>
+              <a:rPr lang="en-US" dirty="0" smtClean="0"/>
+              <a:t>LESS</a:t>
+            </a:r>
+          </a:p>
+          <a:p>
+            <a:pPr algn="ctr"/>
+            <a:r>
+              <a:rPr lang="en-US" dirty="0" smtClean="0"/>
+              <a:t>compiler</a:t>
+            </a:r>
+            <a:endParaRPr lang="en-US" dirty="0"/>
+          </a:p>
+        </p:txBody>
+      </p:sp>
+      <p:sp>
+        <p:nvSpPr>
+          <p:cNvPr id="4" name="Folded Corner 3"/>
+          <p:cNvSpPr/>
+          <p:nvPr/>
+        </p:nvSpPr>
+        <p:spPr>
+          <a:xfrm>
+            <a:off x="7222523" y="2057307"/>
+            <a:ext cx="1559585" cy="2205849"/>
+          </a:xfrm>
+          <a:prstGeom prst="foldedCorner">
+            <a:avLst/>
+          </a:prstGeom>
+        </p:spPr>
+        <p:style>
+          <a:lnRef idx="1">
+            <a:schemeClr val="accent1"/>
+          </a:lnRef>
+          <a:fillRef idx="3">
+            <a:schemeClr val="accent1"/>
+          </a:fillRef>
+          <a:effectRef idx="2">
+            <a:schemeClr val="accent1"/>
+          </a:effectRef>
+          <a:fontRef idx="minor">
+            <a:schemeClr val="lt1"/>
+          </a:fontRef>
+        </p:style>
+        <p:txBody>
+          <a:bodyPr rtlCol="0" anchor="ctr"/>
+          <a:lstStyle/>
+          <a:p>
+            <a:pPr algn="ctr"/>
+            <a:r>
+              <a:rPr lang="en-US" dirty="0" err="1" smtClean="0"/>
+              <a:t>styles.css</a:t>
+            </a:r>
+            <a:endParaRPr lang="en-US" dirty="0"/>
+          </a:p>
+        </p:txBody>
+      </p:sp>
+      <p:sp>
+        <p:nvSpPr>
+          <p:cNvPr id="5" name="Right Arrow 4"/>
+          <p:cNvSpPr/>
+          <p:nvPr/>
+        </p:nvSpPr>
+        <p:spPr>
+          <a:xfrm>
+            <a:off x="2183420" y="2993122"/>
+            <a:ext cx="1076857" cy="282230"/>
+          </a:xfrm>
+          <a:prstGeom prst="rightArrow">
+            <a:avLst/>
+          </a:prstGeom>
+        </p:spPr>
+        <p:style>
+          <a:lnRef idx="1">
+            <a:schemeClr val="accent1"/>
+          </a:lnRef>
+          <a:fillRef idx="3">
+            <a:schemeClr val="accent1"/>
+          </a:fillRef>
+          <a:effectRef idx="2">
+            <a:schemeClr val="accent1"/>
+          </a:effectRef>
+          <a:fontRef idx="minor">
+            <a:schemeClr val="lt1"/>
+          </a:fontRef>
+        </p:style>
+        <p:txBody>
+          <a:bodyPr rtlCol="0" anchor="ctr"/>
+          <a:lstStyle/>
+          <a:p>
+            <a:pPr algn="ctr"/>
+            <a:endParaRPr lang="en-US"/>
+          </a:p>
+        </p:txBody>
+      </p:sp>
+      <p:sp>
+        <p:nvSpPr>
+          <p:cNvPr id="6" name="Right Arrow 5"/>
+          <p:cNvSpPr/>
+          <p:nvPr/>
+        </p:nvSpPr>
+        <p:spPr>
+          <a:xfrm>
+            <a:off x="5893161" y="2993122"/>
+            <a:ext cx="1076857" cy="282230"/>
+          </a:xfrm>
+          <a:prstGeom prst="rightArrow">
+            <a:avLst/>
+          </a:prstGeom>
+        </p:spPr>
+        <p:style>
+          <a:lnRef idx="1">
+            <a:schemeClr val="accent1"/>
+          </a:lnRef>
+          <a:fillRef idx="3">
+            <a:schemeClr val="accent1"/>
+          </a:fillRef>
+          <a:effectRef idx="2">
+            <a:schemeClr val="accent1"/>
+          </a:effectRef>
+          <a:fontRef idx="minor">
+            <a:schemeClr val="lt1"/>
+          </a:fontRef>
+        </p:style>
+        <p:txBody>
+          <a:bodyPr rtlCol="0" anchor="ctr"/>
+          <a:lstStyle/>
+          <a:p>
+            <a:pPr algn="ctr"/>
+            <a:endParaRPr lang="en-US"/>
+          </a:p>
+        </p:txBody>
+      </p:sp>
+      <p:sp>
+        <p:nvSpPr>
+          <p:cNvPr id="7" name="TextBox 6"/>
           <p:cNvSpPr txBox="1"/>
           <p:nvPr/>
         </p:nvSpPr>
         <p:spPr>
           <a:xfrm>
-            <a:off x="393609" y="386210"/>
-            <a:ext cx="4506237" cy="646331"/>
+            <a:off x="2361659" y="2631217"/>
+            <a:ext cx="684803" cy="369332"/>
           </a:xfrm>
           <a:prstGeom prst="rect">
             <a:avLst/>
@@ -3796,27 +4435,23 @@
           <a:lstStyle/>
           <a:p>
             <a:r>
-              <a:rPr lang="en-US" sz="3600" dirty="0" smtClean="0">
-                <a:latin typeface="+mj-lt"/>
-              </a:rPr>
-              <a:t>What’s the Difference?</a:t>
-            </a:r>
-            <a:endParaRPr lang="en-US" sz="3600" dirty="0">
-              <a:latin typeface="+mj-lt"/>
-            </a:endParaRPr>
-          </a:p>
-        </p:txBody>
-      </p:sp>
-      <p:sp>
-        <p:nvSpPr>
-          <p:cNvPr id="5" name="TextBox 4"/>
+              <a:rPr lang="en-US" dirty="0" smtClean="0"/>
+              <a:t>input</a:t>
+            </a:r>
+            <a:endParaRPr lang="en-US" dirty="0"/>
+          </a:p>
+        </p:txBody>
+      </p:sp>
+      <p:sp>
+        <p:nvSpPr>
+          <p:cNvPr id="8" name="TextBox 7"/>
           <p:cNvSpPr txBox="1"/>
           <p:nvPr/>
         </p:nvSpPr>
         <p:spPr>
           <a:xfrm>
-            <a:off x="1373922" y="1500274"/>
-            <a:ext cx="6943870" cy="830997"/>
+            <a:off x="5974854" y="2627648"/>
+            <a:ext cx="825867" cy="369332"/>
           </a:xfrm>
           <a:prstGeom prst="rect">
             <a:avLst/>
@@ -3824,32 +4459,29 @@
           <a:noFill/>
         </p:spPr>
         <p:txBody>
-          <a:bodyPr wrap="square" rtlCol="0">
+          <a:bodyPr wrap="none" rtlCol="0">
             <a:spAutoFit/>
           </a:bodyPr>
           <a:lstStyle/>
           <a:p>
             <a:r>
-              <a:rPr lang="en-US" sz="2400" dirty="0" smtClean="0">
-                <a:solidFill>
-                  <a:srgbClr val="000000"/>
-                </a:solidFill>
-              </a:rPr>
-              <a:t>Language extensions are nearly identical, with a few specialized features here and there</a:t>
-            </a:r>
-          </a:p>
-        </p:txBody>
-      </p:sp>
-      <p:sp>
-        <p:nvSpPr>
-          <p:cNvPr id="6" name="TextBox 5"/>
+              <a:rPr lang="en-US" dirty="0" smtClean="0"/>
+              <a:t>output</a:t>
+            </a:r>
+            <a:endParaRPr lang="en-US" dirty="0"/>
+          </a:p>
+        </p:txBody>
+      </p:sp>
+      <p:sp>
+        <p:nvSpPr>
+          <p:cNvPr id="9" name="TextBox 8"/>
           <p:cNvSpPr txBox="1"/>
           <p:nvPr/>
         </p:nvSpPr>
         <p:spPr>
           <a:xfrm>
-            <a:off x="1373922" y="2900925"/>
-            <a:ext cx="6943870" cy="461665"/>
+            <a:off x="274784" y="1039795"/>
+            <a:ext cx="2086875" cy="923330"/>
           </a:xfrm>
           <a:prstGeom prst="rect">
             <a:avLst/>
@@ -3863,22 +4495,23 @@
           <a:lstStyle/>
           <a:p>
             <a:r>
-              <a:rPr lang="en-US" sz="2400" dirty="0" smtClean="0"/>
-              <a:t>SASS is built on Ruby; LESS is built on JavaScript</a:t>
-            </a:r>
-          </a:p>
-        </p:txBody>
-      </p:sp>
-      <p:sp>
-        <p:nvSpPr>
-          <p:cNvPr id="8" name="TextBox 7"/>
+              <a:rPr lang="en-US" dirty="0" smtClean="0"/>
+              <a:t>LESS file that uses various language extensions</a:t>
+            </a:r>
+            <a:endParaRPr lang="en-US" dirty="0"/>
+          </a:p>
+        </p:txBody>
+      </p:sp>
+      <p:sp>
+        <p:nvSpPr>
+          <p:cNvPr id="10" name="TextBox 9"/>
           <p:cNvSpPr txBox="1"/>
           <p:nvPr/>
         </p:nvSpPr>
         <p:spPr>
           <a:xfrm>
-            <a:off x="1373922" y="3932243"/>
-            <a:ext cx="6943870" cy="830997"/>
+            <a:off x="6695233" y="1039795"/>
+            <a:ext cx="2086875" cy="923330"/>
           </a:xfrm>
           <a:prstGeom prst="rect">
             <a:avLst/>
@@ -3891,41 +4524,19 @@
           </a:bodyPr>
           <a:lstStyle/>
           <a:p>
-            <a:r>
-              <a:rPr lang="en-US" sz="2400" dirty="0" smtClean="0"/>
-              <a:t>Both require a compile operation, but LESS has support for compiling in the browser</a:t>
-            </a:r>
-          </a:p>
-        </p:txBody>
-      </p:sp>
-      <p:pic>
-        <p:nvPicPr>
-          <p:cNvPr id="9" name="Picture 8"/>
-          <p:cNvPicPr>
-            <a:picLocks noChangeAspect="1"/>
-          </p:cNvPicPr>
-          <p:nvPr/>
-        </p:nvPicPr>
-        <p:blipFill>
-          <a:blip r:embed="rId2"/>
-          <a:stretch>
-            <a:fillRect/>
-          </a:stretch>
-        </p:blipFill>
-        <p:spPr>
-          <a:xfrm>
-            <a:off x="6676512" y="5755224"/>
-            <a:ext cx="1937647" cy="788690"/>
-          </a:xfrm>
-          <a:prstGeom prst="rect">
-            <a:avLst/>
-          </a:prstGeom>
-        </p:spPr>
-      </p:pic>
+            <a:pPr algn="r"/>
+            <a:r>
+              <a:rPr lang="en-US" dirty="0" smtClean="0"/>
+              <a:t>Standard CSS file that browsers can understand</a:t>
+            </a:r>
+            <a:endParaRPr lang="en-US" dirty="0"/>
+          </a:p>
+        </p:txBody>
+      </p:sp>
     </p:spTree>
     <p:extLst>
       <p:ext uri="{BB962C8B-B14F-4D97-AF65-F5344CB8AC3E}">
-        <p14:creationId xmlns:p14="http://schemas.microsoft.com/office/powerpoint/2010/main" val="3947024053"/>
+        <p14:creationId xmlns:p14="http://schemas.microsoft.com/office/powerpoint/2010/main" val="3245662489"/>
       </p:ext>
     </p:extLst>
   </p:cSld>
@@ -3961,7 +4572,7 @@
         <p:spPr>
           <a:xfrm>
             <a:off x="393609" y="386210"/>
-            <a:ext cx="4080188" cy="646331"/>
+            <a:ext cx="4506237" cy="646331"/>
           </a:xfrm>
           <a:prstGeom prst="rect">
             <a:avLst/>
@@ -3978,7 +4589,13 @@
               <a:rPr lang="en-US" sz="3600" dirty="0" smtClean="0">
                 <a:latin typeface="+mj-lt"/>
               </a:rPr>
-              <a:t>Language Extensions</a:t>
+              <a:t>What’s the </a:t>
+            </a:r>
+            <a:r>
+              <a:rPr lang="en-US" sz="3600" dirty="0" smtClean="0">
+                <a:latin typeface="+mj-lt"/>
+              </a:rPr>
+              <a:t>Difference?</a:t>
             </a:r>
             <a:endParaRPr lang="en-US" sz="3600" dirty="0">
               <a:latin typeface="+mj-lt"/>
@@ -3994,8 +4611,8 @@
         </p:nvSpPr>
         <p:spPr>
           <a:xfrm>
-            <a:off x="1757320" y="1552856"/>
-            <a:ext cx="5629361" cy="461665"/>
+            <a:off x="1373922" y="1500274"/>
+            <a:ext cx="6943870" cy="830997"/>
           </a:xfrm>
           <a:prstGeom prst="rect">
             <a:avLst/>
@@ -4008,142 +4625,27 @@
           </a:bodyPr>
           <a:lstStyle/>
           <a:p>
-            <a:pPr algn="ctr"/>
-            <a:r>
-              <a:rPr lang="en-US" sz="2400" dirty="0" smtClean="0"/>
-              <a:t>Variables for values used in multiple places</a:t>
-            </a:r>
-          </a:p>
-        </p:txBody>
-      </p:sp>
-      <p:sp>
-        <p:nvSpPr>
-          <p:cNvPr id="3" name="TextBox 2"/>
+            <a:r>
+              <a:rPr lang="en-US" sz="2400" dirty="0" smtClean="0">
+                <a:solidFill>
+                  <a:srgbClr val="000000"/>
+                </a:solidFill>
+              </a:rPr>
+              <a:t>Language extensions are nearly identical, with a few specialized features here and there</a:t>
+            </a:r>
+          </a:p>
+        </p:txBody>
+      </p:sp>
+      <p:sp>
+        <p:nvSpPr>
+          <p:cNvPr id="6" name="TextBox 5"/>
           <p:cNvSpPr txBox="1"/>
           <p:nvPr/>
         </p:nvSpPr>
         <p:spPr>
           <a:xfrm>
-            <a:off x="89117" y="2866862"/>
-            <a:ext cx="4485667" cy="2585323"/>
-          </a:xfrm>
-          <a:prstGeom prst="rect">
-            <a:avLst/>
-          </a:prstGeom>
-          <a:solidFill>
-            <a:schemeClr val="bg1">
-              <a:lumMod val="85000"/>
-            </a:schemeClr>
-          </a:solidFill>
-        </p:spPr>
-        <p:txBody>
-          <a:bodyPr wrap="square" rtlCol="0">
-            <a:spAutoFit/>
-          </a:bodyPr>
-          <a:lstStyle/>
-          <a:p>
-            <a:r>
-              <a:rPr lang="en-US" sz="1600" dirty="0" smtClean="0">
-                <a:latin typeface="Courier New"/>
-                <a:cs typeface="Courier New"/>
-              </a:rPr>
-              <a:t>@accent-color: #FF7F40;</a:t>
-            </a:r>
-          </a:p>
-          <a:p>
-            <a:r>
-              <a:rPr lang="en-US" sz="1600" dirty="0" smtClean="0">
-                <a:latin typeface="Courier New"/>
-                <a:cs typeface="Courier New"/>
-              </a:rPr>
-              <a:t>@shading-color: #FFB873;</a:t>
-            </a:r>
-          </a:p>
-          <a:p>
-            <a:endParaRPr lang="en-US" sz="1600" dirty="0" smtClean="0">
-              <a:latin typeface="Courier New"/>
-              <a:cs typeface="Courier New"/>
-            </a:endParaRPr>
-          </a:p>
-          <a:p>
-            <a:r>
-              <a:rPr lang="en-US" sz="1600" dirty="0" smtClean="0">
-                <a:latin typeface="Courier New"/>
-                <a:cs typeface="Courier New"/>
-              </a:rPr>
-              <a:t>h1 {</a:t>
-            </a:r>
-          </a:p>
-          <a:p>
-            <a:r>
-              <a:rPr lang="en-US" sz="1600" dirty="0" smtClean="0">
-                <a:latin typeface="Courier New"/>
-                <a:cs typeface="Courier New"/>
-              </a:rPr>
-              <a:t>  color: @accent-color;</a:t>
-            </a:r>
-          </a:p>
-          <a:p>
-            <a:r>
-              <a:rPr lang="en-US" sz="1600" dirty="0" smtClean="0">
-                <a:latin typeface="Courier New"/>
-                <a:cs typeface="Courier New"/>
-              </a:rPr>
-              <a:t>}</a:t>
-            </a:r>
-          </a:p>
-          <a:p>
-            <a:endParaRPr lang="en-US" sz="1600" dirty="0" smtClean="0">
-              <a:latin typeface="Courier New"/>
-              <a:cs typeface="Courier New"/>
-            </a:endParaRPr>
-          </a:p>
-          <a:p>
-            <a:r>
-              <a:rPr lang="en-US" sz="1600" dirty="0" smtClean="0">
-                <a:latin typeface="Courier New"/>
-                <a:cs typeface="Courier New"/>
-              </a:rPr>
-              <a:t>footer {</a:t>
-            </a:r>
-          </a:p>
-          <a:p>
-            <a:r>
-              <a:rPr lang="en-US" sz="1600" dirty="0">
-                <a:latin typeface="Courier New"/>
-                <a:cs typeface="Courier New"/>
-              </a:rPr>
-              <a:t> </a:t>
-            </a:r>
-            <a:r>
-              <a:rPr lang="en-US" sz="1600" dirty="0" smtClean="0">
-                <a:latin typeface="Courier New"/>
-                <a:cs typeface="Courier New"/>
-              </a:rPr>
-              <a:t> background-color: @shading-color;</a:t>
-            </a:r>
-          </a:p>
-          <a:p>
-            <a:r>
-              <a:rPr lang="en-US" sz="1600" dirty="0">
-                <a:latin typeface="Courier New"/>
-                <a:cs typeface="Courier New"/>
-              </a:rPr>
-              <a:t>}</a:t>
-            </a:r>
-          </a:p>
-        </p:txBody>
-      </p:sp>
-      <p:sp>
-        <p:nvSpPr>
-          <p:cNvPr id="8" name="TextBox 7"/>
-          <p:cNvSpPr txBox="1"/>
-          <p:nvPr/>
-        </p:nvSpPr>
-        <p:spPr>
-          <a:xfrm>
-            <a:off x="89117" y="2428662"/>
-            <a:ext cx="3132175" cy="369332"/>
+            <a:off x="1373922" y="2900925"/>
+            <a:ext cx="6943870" cy="461665"/>
           </a:xfrm>
           <a:prstGeom prst="rect">
             <a:avLst/>
@@ -4151,123 +4653,28 @@
           <a:noFill/>
         </p:spPr>
         <p:txBody>
-          <a:bodyPr wrap="none" rtlCol="0">
-            <a:spAutoFit/>
-          </a:bodyPr>
-          <a:lstStyle/>
-          <a:p>
-            <a:r>
-              <a:rPr lang="en-US" dirty="0" smtClean="0"/>
-              <a:t>LESS (SASS uses $ instead of @)</a:t>
-            </a:r>
-            <a:endParaRPr lang="en-US" dirty="0"/>
-          </a:p>
-        </p:txBody>
-      </p:sp>
-      <p:sp>
-        <p:nvSpPr>
-          <p:cNvPr id="9" name="TextBox 8"/>
-          <p:cNvSpPr txBox="1"/>
-          <p:nvPr/>
-        </p:nvSpPr>
-        <p:spPr>
-          <a:xfrm>
-            <a:off x="4606344" y="2866862"/>
-            <a:ext cx="4485667" cy="1815882"/>
-          </a:xfrm>
-          <a:prstGeom prst="rect">
-            <a:avLst/>
-          </a:prstGeom>
-          <a:solidFill>
-            <a:schemeClr val="bg1">
-              <a:lumMod val="95000"/>
-            </a:schemeClr>
-          </a:solidFill>
-        </p:spPr>
-        <p:txBody>
           <a:bodyPr wrap="square" rtlCol="0">
             <a:spAutoFit/>
           </a:bodyPr>
           <a:lstStyle/>
           <a:p>
             <a:r>
-              <a:rPr lang="en-US" sz="1600" dirty="0" smtClean="0">
-                <a:latin typeface="Courier New"/>
-                <a:cs typeface="Courier New"/>
-              </a:rPr>
-              <a:t>h1 {</a:t>
-            </a:r>
-          </a:p>
-          <a:p>
-            <a:r>
-              <a:rPr lang="en-US" sz="1600" dirty="0" smtClean="0">
-                <a:latin typeface="Courier New"/>
-                <a:cs typeface="Courier New"/>
-              </a:rPr>
-              <a:t>  color: #FF7F40;</a:t>
-            </a:r>
-          </a:p>
-          <a:p>
-            <a:r>
-              <a:rPr lang="en-US" sz="1600" dirty="0" smtClean="0">
-                <a:latin typeface="Courier New"/>
-                <a:cs typeface="Courier New"/>
-              </a:rPr>
-              <a:t>}</a:t>
-            </a:r>
-          </a:p>
-          <a:p>
-            <a:endParaRPr lang="en-US" sz="1600" dirty="0" smtClean="0">
-              <a:latin typeface="Courier New"/>
-              <a:cs typeface="Courier New"/>
-            </a:endParaRPr>
-          </a:p>
-          <a:p>
-            <a:r>
-              <a:rPr lang="en-US" sz="1600" dirty="0" smtClean="0">
-                <a:latin typeface="Courier New"/>
-                <a:cs typeface="Courier New"/>
-              </a:rPr>
-              <a:t>footer {</a:t>
-            </a:r>
-          </a:p>
-          <a:p>
-            <a:r>
-              <a:rPr lang="en-US" sz="1600" dirty="0">
-                <a:latin typeface="Courier New"/>
-                <a:cs typeface="Courier New"/>
-              </a:rPr>
-              <a:t> </a:t>
-            </a:r>
-            <a:r>
-              <a:rPr lang="en-US" sz="1600" dirty="0" smtClean="0">
-                <a:latin typeface="Courier New"/>
-                <a:cs typeface="Courier New"/>
-              </a:rPr>
-              <a:t> background-color: #FFB873;</a:t>
-            </a:r>
-          </a:p>
-          <a:p>
-            <a:r>
-              <a:rPr lang="en-US" sz="1600" dirty="0">
-                <a:latin typeface="Courier New"/>
-                <a:cs typeface="Courier New"/>
-              </a:rPr>
-              <a:t>}</a:t>
-            </a:r>
-          </a:p>
-        </p:txBody>
-      </p:sp>
-      <p:sp>
-        <p:nvSpPr>
-          <p:cNvPr id="10" name="TextBox 9"/>
+              <a:rPr lang="en-US" sz="2400" dirty="0" smtClean="0"/>
+              <a:t>SASS is built on Ruby; LESS is built on JavaScript</a:t>
+            </a:r>
+          </a:p>
+        </p:txBody>
+      </p:sp>
+      <p:sp>
+        <p:nvSpPr>
+          <p:cNvPr id="8" name="TextBox 7"/>
           <p:cNvSpPr txBox="1"/>
           <p:nvPr/>
         </p:nvSpPr>
         <p:spPr>
           <a:xfrm>
-            <a:off x="4606344" y="2428662"/>
-            <a:ext cx="1467068" cy="369332"/>
+            <a:off x="1373922" y="3932243"/>
+            <a:ext cx="6943870" cy="830997"/>
           </a:xfrm>
           <a:prstGeom prst="rect">
             <a:avLst/>
@@ -4275,23 +4682,70 @@
           <a:noFill/>
         </p:spPr>
         <p:txBody>
-          <a:bodyPr wrap="none" rtlCol="0">
+          <a:bodyPr wrap="square" rtlCol="0">
             <a:spAutoFit/>
           </a:bodyPr>
           <a:lstStyle/>
           <a:p>
             <a:r>
-              <a:rPr lang="en-US" dirty="0" smtClean="0"/>
-              <a:t>Compiled CSS</a:t>
-            </a:r>
-            <a:endParaRPr lang="en-US" dirty="0"/>
-          </a:p>
-        </p:txBody>
-      </p:sp>
+              <a:rPr lang="en-US" sz="2400" dirty="0" smtClean="0"/>
+              <a:t>Both require a compile operation, but LESS has support for compiling in the browser</a:t>
+            </a:r>
+          </a:p>
+        </p:txBody>
+      </p:sp>
+      <p:pic>
+        <p:nvPicPr>
+          <p:cNvPr id="9" name="Picture 8"/>
+          <p:cNvPicPr>
+            <a:picLocks noChangeAspect="1"/>
+          </p:cNvPicPr>
+          <p:nvPr/>
+        </p:nvPicPr>
+        <p:blipFill>
+          <a:blip r:embed="rId2"/>
+          <a:stretch>
+            <a:fillRect/>
+          </a:stretch>
+        </p:blipFill>
+        <p:spPr>
+          <a:xfrm>
+            <a:off x="6676512" y="5755224"/>
+            <a:ext cx="1937647" cy="788690"/>
+          </a:xfrm>
+          <a:prstGeom prst="rect">
+            <a:avLst/>
+          </a:prstGeom>
+        </p:spPr>
+      </p:pic>
+      <p:pic>
+        <p:nvPicPr>
+          <p:cNvPr id="7" name="Picture 6"/>
+          <p:cNvPicPr>
+            <a:picLocks noChangeAspect="1"/>
+          </p:cNvPicPr>
+          <p:nvPr/>
+        </p:nvPicPr>
+        <p:blipFill>
+          <a:blip r:embed="rId3"/>
+          <a:stretch>
+            <a:fillRect/>
+          </a:stretch>
+        </p:blipFill>
+        <p:spPr>
+          <a:xfrm>
+            <a:off x="511302" y="5755225"/>
+            <a:ext cx="1051586" cy="788690"/>
+          </a:xfrm>
+          <a:prstGeom prst="rect">
+            <a:avLst/>
+          </a:prstGeom>
+        </p:spPr>
+      </p:pic>
     </p:spTree>
     <p:extLst>
       <p:ext uri="{BB962C8B-B14F-4D97-AF65-F5344CB8AC3E}">
-        <p14:creationId xmlns:p14="http://schemas.microsoft.com/office/powerpoint/2010/main" val="1045098556"/>
+        <p14:creationId xmlns:p14="http://schemas.microsoft.com/office/powerpoint/2010/main" val="3947024053"/>
       </p:ext>
     </p:extLst>
   </p:cSld>
@@ -4377,7 +4831,7 @@
             <a:pPr algn="ctr"/>
             <a:r>
               <a:rPr lang="en-US" sz="2400" dirty="0" smtClean="0"/>
-              <a:t>Mix-Ins for sets of related properties</a:t>
+              <a:t>Variables for values used in multiple places</a:t>
             </a:r>
           </a:p>
         </p:txBody>
@@ -4391,7 +4845,7 @@
         <p:spPr>
           <a:xfrm>
             <a:off x="89117" y="2866862"/>
-            <a:ext cx="4485667" cy="3785652"/>
+            <a:ext cx="4485667" cy="2585323"/>
           </a:xfrm>
           <a:prstGeom prst="rect">
             <a:avLst/>
@@ -4409,340 +4863,95 @@
           <a:lstStyle/>
           <a:p>
             <a:r>
-              <a:rPr lang="en-US" sz="1600" dirty="0">
-                <a:latin typeface="Courier New"/>
-                <a:cs typeface="Courier New"/>
-              </a:rPr>
-              <a:t>.</a:t>
-            </a:r>
-            <a:r>
-              <a:rPr lang="en-US" sz="1600" dirty="0" smtClean="0">
-                <a:latin typeface="Courier New"/>
-                <a:cs typeface="Courier New"/>
-              </a:rPr>
-              <a:t>trans(@</a:t>
-            </a:r>
-            <a:r>
-              <a:rPr lang="en-US" sz="1600" dirty="0" err="1" smtClean="0">
-                <a:latin typeface="Courier New"/>
-                <a:cs typeface="Courier New"/>
-              </a:rPr>
-              <a:t>dur</a:t>
-            </a:r>
-            <a:r>
-              <a:rPr lang="en-US" sz="1600" dirty="0" smtClean="0">
-                <a:latin typeface="Courier New"/>
-                <a:cs typeface="Courier New"/>
-              </a:rPr>
-              <a:t>: 1s) {</a:t>
-            </a:r>
-          </a:p>
-          <a:p>
-            <a:r>
-              <a:rPr lang="en-US" sz="1600" dirty="0" smtClean="0">
-                <a:latin typeface="Courier New"/>
-                <a:cs typeface="Courier New"/>
-              </a:rPr>
-              <a:t>  -</a:t>
-            </a:r>
-            <a:r>
-              <a:rPr lang="en-US" sz="1600" dirty="0" err="1" smtClean="0">
-                <a:latin typeface="Courier New"/>
-                <a:cs typeface="Courier New"/>
-              </a:rPr>
-              <a:t>webkit</a:t>
-            </a:r>
-            <a:r>
-              <a:rPr lang="en-US" sz="1600" dirty="0" smtClean="0">
-                <a:latin typeface="Courier New"/>
-                <a:cs typeface="Courier New"/>
-              </a:rPr>
-              <a:t>-transition: all @</a:t>
-            </a:r>
-            <a:r>
-              <a:rPr lang="en-US" sz="1600" dirty="0" err="1" smtClean="0">
-                <a:latin typeface="Courier New"/>
-                <a:cs typeface="Courier New"/>
-              </a:rPr>
-              <a:t>dur</a:t>
-            </a:r>
-            <a:r>
-              <a:rPr lang="en-US" sz="1600" dirty="0" smtClean="0">
-                <a:latin typeface="Courier New"/>
-                <a:cs typeface="Courier New"/>
-              </a:rPr>
-              <a:t>;</a:t>
-            </a:r>
-          </a:p>
-          <a:p>
-            <a:r>
-              <a:rPr lang="en-US" sz="1600" dirty="0">
-                <a:latin typeface="Courier New"/>
-                <a:cs typeface="Courier New"/>
-              </a:rPr>
-              <a:t> </a:t>
-            </a:r>
-            <a:r>
-              <a:rPr lang="en-US" sz="1600" dirty="0" smtClean="0">
-                <a:latin typeface="Courier New"/>
-                <a:cs typeface="Courier New"/>
-              </a:rPr>
-              <a:t> -</a:t>
-            </a:r>
-            <a:r>
-              <a:rPr lang="en-US" sz="1600" dirty="0" err="1" smtClean="0">
-                <a:latin typeface="Courier New"/>
-                <a:cs typeface="Courier New"/>
-              </a:rPr>
-              <a:t>moz</a:t>
-            </a:r>
-            <a:r>
-              <a:rPr lang="en-US" sz="1600" dirty="0" smtClean="0">
-                <a:latin typeface="Courier New"/>
-                <a:cs typeface="Courier New"/>
-              </a:rPr>
-              <a:t>-transition: all @</a:t>
-            </a:r>
-            <a:r>
-              <a:rPr lang="en-US" sz="1600" dirty="0" err="1" smtClean="0">
-                <a:latin typeface="Courier New"/>
-                <a:cs typeface="Courier New"/>
-              </a:rPr>
-              <a:t>dur</a:t>
-            </a:r>
-            <a:r>
-              <a:rPr lang="en-US" sz="1600" dirty="0" smtClean="0">
-                <a:latin typeface="Courier New"/>
-                <a:cs typeface="Courier New"/>
-              </a:rPr>
-              <a:t>;</a:t>
-            </a:r>
-          </a:p>
-          <a:p>
-            <a:r>
-              <a:rPr lang="en-US" sz="1600" dirty="0">
-                <a:latin typeface="Courier New"/>
-                <a:cs typeface="Courier New"/>
-              </a:rPr>
-              <a:t> </a:t>
-            </a:r>
-            <a:r>
-              <a:rPr lang="en-US" sz="1600" dirty="0" smtClean="0">
-                <a:latin typeface="Courier New"/>
-                <a:cs typeface="Courier New"/>
-              </a:rPr>
-              <a:t> -o-transition: all @</a:t>
-            </a:r>
-            <a:r>
-              <a:rPr lang="en-US" sz="1600" dirty="0" err="1" smtClean="0">
-                <a:latin typeface="Courier New"/>
-                <a:cs typeface="Courier New"/>
-              </a:rPr>
-              <a:t>dur</a:t>
-            </a:r>
-            <a:r>
-              <a:rPr lang="en-US" sz="1600" dirty="0" smtClean="0">
-                <a:latin typeface="Courier New"/>
-                <a:cs typeface="Courier New"/>
-              </a:rPr>
-              <a:t>;</a:t>
-            </a:r>
-          </a:p>
-          <a:p>
-            <a:r>
-              <a:rPr lang="en-US" sz="1600" dirty="0">
-                <a:latin typeface="Courier New"/>
-                <a:cs typeface="Courier New"/>
-              </a:rPr>
-              <a:t> </a:t>
-            </a:r>
-            <a:r>
-              <a:rPr lang="en-US" sz="1600" dirty="0" smtClean="0">
-                <a:latin typeface="Courier New"/>
-                <a:cs typeface="Courier New"/>
-              </a:rPr>
-              <a:t> -</a:t>
-            </a:r>
-            <a:r>
-              <a:rPr lang="en-US" sz="1600" dirty="0" err="1" smtClean="0">
-                <a:latin typeface="Courier New"/>
-                <a:cs typeface="Courier New"/>
-              </a:rPr>
-              <a:t>ms</a:t>
-            </a:r>
-            <a:r>
-              <a:rPr lang="en-US" sz="1600" dirty="0" smtClean="0">
-                <a:latin typeface="Courier New"/>
-                <a:cs typeface="Courier New"/>
-              </a:rPr>
-              <a:t>-transition: all @</a:t>
-            </a:r>
-            <a:r>
-              <a:rPr lang="en-US" sz="1600" dirty="0" err="1" smtClean="0">
-                <a:latin typeface="Courier New"/>
-                <a:cs typeface="Courier New"/>
-              </a:rPr>
-              <a:t>dur</a:t>
-            </a:r>
-            <a:r>
-              <a:rPr lang="en-US" sz="1600" dirty="0" smtClean="0">
-                <a:latin typeface="Courier New"/>
-                <a:cs typeface="Courier New"/>
-              </a:rPr>
-              <a:t>;</a:t>
-            </a:r>
-          </a:p>
-          <a:p>
-            <a:r>
-              <a:rPr lang="en-US" sz="1600" dirty="0">
-                <a:latin typeface="Courier New"/>
-                <a:cs typeface="Courier New"/>
-              </a:rPr>
-              <a:t> </a:t>
-            </a:r>
-            <a:r>
-              <a:rPr lang="en-US" sz="1600" dirty="0" smtClean="0">
-                <a:latin typeface="Courier New"/>
-                <a:cs typeface="Courier New"/>
-              </a:rPr>
-              <a:t> transition: all @</a:t>
-            </a:r>
-            <a:r>
-              <a:rPr lang="en-US" sz="1600" dirty="0" err="1" smtClean="0">
-                <a:latin typeface="Courier New"/>
-                <a:cs typeface="Courier New"/>
-              </a:rPr>
-              <a:t>dur</a:t>
-            </a:r>
-            <a:r>
-              <a:rPr lang="en-US" sz="1600" dirty="0" smtClean="0">
-                <a:latin typeface="Courier New"/>
-                <a:cs typeface="Courier New"/>
-              </a:rPr>
-              <a:t>;</a:t>
-            </a:r>
-          </a:p>
-          <a:p>
-            <a:r>
-              <a:rPr lang="en-US" sz="1600" dirty="0" smtClean="0">
-                <a:latin typeface="Courier New"/>
-                <a:cs typeface="Courier New"/>
-              </a:rPr>
-              <a:t>}</a:t>
-            </a:r>
-          </a:p>
-          <a:p>
-            <a:endParaRPr lang="en-US" sz="1600" dirty="0">
-              <a:latin typeface="Courier New"/>
-              <a:cs typeface="Courier New"/>
-            </a:endParaRPr>
-          </a:p>
-          <a:p>
-            <a:r>
-              <a:rPr lang="en-US" sz="1600" dirty="0" err="1" smtClean="0">
-                <a:latin typeface="Courier New"/>
-                <a:cs typeface="Courier New"/>
-              </a:rPr>
-              <a:t>nav</a:t>
-            </a:r>
-            <a:r>
-              <a:rPr lang="en-US" sz="1600" dirty="0" smtClean="0">
-                <a:latin typeface="Courier New"/>
-                <a:cs typeface="Courier New"/>
-              </a:rPr>
-              <a:t> a {</a:t>
-            </a:r>
-          </a:p>
-          <a:p>
-            <a:r>
-              <a:rPr lang="en-US" sz="1600" dirty="0">
-                <a:latin typeface="Courier New"/>
-                <a:cs typeface="Courier New"/>
-              </a:rPr>
-              <a:t> </a:t>
-            </a:r>
-            <a:r>
-              <a:rPr lang="en-US" sz="1600" dirty="0" smtClean="0">
-                <a:latin typeface="Courier New"/>
-                <a:cs typeface="Courier New"/>
-              </a:rPr>
-              <a:t> .trans;</a:t>
-            </a:r>
-          </a:p>
-          <a:p>
-            <a:r>
-              <a:rPr lang="en-US" sz="1600" dirty="0" smtClean="0">
-                <a:latin typeface="Courier New"/>
-                <a:cs typeface="Courier New"/>
-              </a:rPr>
-              <a:t>}</a:t>
-            </a:r>
-          </a:p>
-          <a:p>
-            <a:endParaRPr lang="en-US" sz="1600" dirty="0">
-              <a:latin typeface="Courier New"/>
-              <a:cs typeface="Courier New"/>
-            </a:endParaRPr>
-          </a:p>
-          <a:p>
-            <a:r>
-              <a:rPr lang="en-US" sz="1600" dirty="0">
-                <a:latin typeface="Courier New"/>
-                <a:cs typeface="Courier New"/>
-              </a:rPr>
-              <a:t>.</a:t>
-            </a:r>
-            <a:r>
-              <a:rPr lang="en-US" sz="1600" dirty="0" smtClean="0">
-                <a:latin typeface="Courier New"/>
-                <a:cs typeface="Courier New"/>
-              </a:rPr>
-              <a:t>thumbs </a:t>
-            </a:r>
-            <a:r>
-              <a:rPr lang="en-US" sz="1600" dirty="0" err="1" smtClean="0">
-                <a:latin typeface="Courier New"/>
-                <a:cs typeface="Courier New"/>
-              </a:rPr>
-              <a:t>img</a:t>
-            </a:r>
-            <a:r>
-              <a:rPr lang="en-US" sz="1600" dirty="0" smtClean="0">
-                <a:latin typeface="Courier New"/>
-                <a:cs typeface="Courier New"/>
-              </a:rPr>
-              <a:t> {</a:t>
-            </a:r>
-          </a:p>
-          <a:p>
-            <a:r>
-              <a:rPr lang="en-US" sz="1600" dirty="0">
-                <a:latin typeface="Courier New"/>
-                <a:cs typeface="Courier New"/>
-              </a:rPr>
-              <a:t> </a:t>
-            </a:r>
-            <a:r>
-              <a:rPr lang="en-US" sz="1600" dirty="0" smtClean="0">
-                <a:latin typeface="Courier New"/>
-                <a:cs typeface="Courier New"/>
-              </a:rPr>
-              <a:t> .trans(0.5s);</a:t>
-            </a:r>
-          </a:p>
-          <a:p>
-            <a:r>
-              <a:rPr lang="en-US" sz="1600" dirty="0">
-                <a:latin typeface="Courier New"/>
-                <a:cs typeface="Courier New"/>
-              </a:rPr>
-              <a:t>}</a:t>
-            </a:r>
+              <a:rPr lang="en-US" sz="1600" dirty="0" smtClean="0">
+                <a:latin typeface="Courier New"/>
+                <a:cs typeface="Courier New"/>
+              </a:rPr>
+              <a:t>@accent-color: #FF7F40;</a:t>
+            </a:r>
+          </a:p>
+          <a:p>
+            <a:r>
+              <a:rPr lang="en-US" sz="1600" dirty="0" smtClean="0">
+                <a:latin typeface="Courier New"/>
+                <a:cs typeface="Courier New"/>
+              </a:rPr>
+              <a:t>@shading-color: #FFB873;</a:t>
+            </a:r>
+          </a:p>
+          <a:p>
             <a:endParaRPr lang="en-US" sz="1600" dirty="0" smtClean="0">
               <a:latin typeface="Courier New"/>
               <a:cs typeface="Courier New"/>
             </a:endParaRPr>
           </a:p>
+          <a:p>
+            <a:r>
+              <a:rPr lang="en-US" sz="1600" dirty="0" smtClean="0">
+                <a:latin typeface="Courier New"/>
+                <a:cs typeface="Courier New"/>
+              </a:rPr>
+              <a:t>h1 {</a:t>
+            </a:r>
+          </a:p>
+          <a:p>
+            <a:r>
+              <a:rPr lang="en-US" sz="1600" dirty="0" smtClean="0">
+                <a:latin typeface="Courier New"/>
+                <a:cs typeface="Courier New"/>
+              </a:rPr>
+              <a:t>  color: @accent-color;</a:t>
+            </a:r>
+          </a:p>
+          <a:p>
+            <a:r>
+              <a:rPr lang="en-US" sz="1600" dirty="0" smtClean="0">
+                <a:latin typeface="Courier New"/>
+                <a:cs typeface="Courier New"/>
+              </a:rPr>
+              <a:t>}</a:t>
+            </a:r>
+          </a:p>
+          <a:p>
+            <a:endParaRPr lang="en-US" sz="1600" dirty="0" smtClean="0">
+              <a:latin typeface="Courier New"/>
+              <a:cs typeface="Courier New"/>
+            </a:endParaRPr>
+          </a:p>
+          <a:p>
+            <a:r>
+              <a:rPr lang="en-US" sz="1600" dirty="0" smtClean="0">
+                <a:latin typeface="Courier New"/>
+                <a:cs typeface="Courier New"/>
+              </a:rPr>
+              <a:t>footer {</a:t>
+            </a:r>
+          </a:p>
+          <a:p>
+            <a:r>
+              <a:rPr lang="en-US" sz="1600" dirty="0">
+                <a:latin typeface="Courier New"/>
+                <a:cs typeface="Courier New"/>
+              </a:rPr>
+              <a:t> </a:t>
+            </a:r>
+            <a:r>
+              <a:rPr lang="en-US" sz="1600" dirty="0" smtClean="0">
+                <a:latin typeface="Courier New"/>
+                <a:cs typeface="Courier New"/>
+              </a:rPr>
+              <a:t> background-color: @shading-color;</a:t>
+            </a:r>
+          </a:p>
+          <a:p>
+            <a:r>
+              <a:rPr lang="en-US" sz="1600" dirty="0">
+                <a:latin typeface="Courier New"/>
+                <a:cs typeface="Courier New"/>
+              </a:rPr>
+              <a:t>}</a:t>
+            </a:r>
+          </a:p>
         </p:txBody>
       </p:sp>
       <p:sp>
@@ -4754,7 +4963,7 @@
         <p:spPr>
           <a:xfrm>
             <a:off x="89117" y="2428662"/>
-            <a:ext cx="3256295" cy="369332"/>
+            <a:ext cx="2599164" cy="369332"/>
           </a:xfrm>
           <a:prstGeom prst="rect">
             <a:avLst/>
@@ -4773,7 +4982,7 @@
             </a:r>
             <a:r>
               <a:rPr lang="en-US" sz="1400" i="1" dirty="0" smtClean="0"/>
-              <a:t>SASS uses slightly different syntax</a:t>
+              <a:t>SASS uses $ instead of @</a:t>
             </a:r>
             <a:r>
               <a:rPr lang="en-US" dirty="0" smtClean="0"/>
@@ -4792,7 +5001,7 @@
         <p:spPr>
           <a:xfrm>
             <a:off x="4606344" y="2866862"/>
-            <a:ext cx="4485667" cy="3785652"/>
+            <a:ext cx="4485667" cy="1815882"/>
           </a:xfrm>
           <a:prstGeom prst="rect">
             <a:avLst/>
@@ -4810,119 +5019,20 @@
           <a:lstStyle/>
           <a:p>
             <a:r>
-              <a:rPr lang="en-US" sz="1600" dirty="0" err="1" smtClean="0">
-                <a:latin typeface="Courier New"/>
-                <a:cs typeface="Courier New"/>
-              </a:rPr>
-              <a:t>nav</a:t>
-            </a:r>
-            <a:r>
-              <a:rPr lang="en-US" sz="1600" dirty="0" smtClean="0">
-                <a:latin typeface="Courier New"/>
-                <a:cs typeface="Courier New"/>
-              </a:rPr>
-              <a:t> a {</a:t>
-            </a:r>
-          </a:p>
-          <a:p>
-            <a:r>
-              <a:rPr lang="en-US" sz="1600" dirty="0">
-                <a:latin typeface="Courier New"/>
-                <a:cs typeface="Courier New"/>
-              </a:rPr>
-              <a:t> </a:t>
-            </a:r>
-            <a:r>
-              <a:rPr lang="en-US" sz="1600" dirty="0" smtClean="0">
-                <a:latin typeface="Courier New"/>
-                <a:cs typeface="Courier New"/>
-              </a:rPr>
-              <a:t> </a:t>
-            </a:r>
-            <a:r>
-              <a:rPr lang="en-US" sz="1600" dirty="0" smtClean="0">
-                <a:latin typeface="Courier New"/>
-                <a:cs typeface="Courier New"/>
-              </a:rPr>
-              <a:t>-</a:t>
-            </a:r>
-            <a:r>
-              <a:rPr lang="en-US" sz="1600" dirty="0" err="1" smtClean="0">
-                <a:latin typeface="Courier New"/>
-                <a:cs typeface="Courier New"/>
-              </a:rPr>
-              <a:t>webkit</a:t>
-            </a:r>
-            <a:r>
-              <a:rPr lang="en-US" sz="1600" dirty="0" smtClean="0">
-                <a:latin typeface="Courier New"/>
-                <a:cs typeface="Courier New"/>
-              </a:rPr>
-              <a:t>-transition: all 1s;</a:t>
-            </a:r>
-          </a:p>
-          <a:p>
-            <a:r>
-              <a:rPr lang="en-US" sz="1600" dirty="0" smtClean="0">
-                <a:latin typeface="Courier New"/>
-                <a:cs typeface="Courier New"/>
-              </a:rPr>
-              <a:t>  -</a:t>
-            </a:r>
-            <a:r>
-              <a:rPr lang="en-US" sz="1600" dirty="0" err="1" smtClean="0">
-                <a:latin typeface="Courier New"/>
-                <a:cs typeface="Courier New"/>
-              </a:rPr>
-              <a:t>moz</a:t>
-            </a:r>
-            <a:r>
-              <a:rPr lang="en-US" sz="1600" dirty="0" smtClean="0">
-                <a:latin typeface="Courier New"/>
-                <a:cs typeface="Courier New"/>
-              </a:rPr>
-              <a:t>-transition: all 1s;</a:t>
-            </a:r>
-          </a:p>
-          <a:p>
-            <a:r>
-              <a:rPr lang="en-US" sz="1600" dirty="0" smtClean="0">
-                <a:latin typeface="Courier New"/>
-                <a:cs typeface="Courier New"/>
-              </a:rPr>
-              <a:t>  -o-transition: all 1s;</a:t>
-            </a:r>
-          </a:p>
-          <a:p>
-            <a:r>
-              <a:rPr lang="en-US" sz="1600" dirty="0" smtClean="0">
-                <a:latin typeface="Courier New"/>
-                <a:cs typeface="Courier New"/>
-              </a:rPr>
-              <a:t>  -</a:t>
-            </a:r>
-            <a:r>
-              <a:rPr lang="en-US" sz="1600" dirty="0" err="1" smtClean="0">
-                <a:latin typeface="Courier New"/>
-                <a:cs typeface="Courier New"/>
-              </a:rPr>
-              <a:t>ms</a:t>
-            </a:r>
-            <a:r>
-              <a:rPr lang="en-US" sz="1600" dirty="0" smtClean="0">
-                <a:latin typeface="Courier New"/>
-                <a:cs typeface="Courier New"/>
-              </a:rPr>
-              <a:t>-transition: all 1s;</a:t>
-            </a:r>
-          </a:p>
-          <a:p>
-            <a:r>
-              <a:rPr lang="en-US" sz="1600" dirty="0" smtClean="0">
-                <a:latin typeface="Courier New"/>
-                <a:cs typeface="Courier New"/>
-              </a:rPr>
-              <a:t>  transition: all 1s;</a:t>
+              <a:rPr lang="en-US" sz="1600" dirty="0" smtClean="0">
+                <a:latin typeface="Courier New"/>
+                <a:cs typeface="Courier New"/>
+              </a:rPr>
+              <a:t>h1 {</a:t>
+            </a:r>
+          </a:p>
+          <a:p>
+            <a:r>
+              <a:rPr lang="en-US" sz="1600" dirty="0" smtClean="0">
+                <a:latin typeface="Courier New"/>
+                <a:cs typeface="Courier New"/>
+              </a:rPr>
+              <a:t>  color: #FF7F40;</a:t>
             </a:r>
           </a:p>
           <a:p>
@@ -4935,134 +5045,45 @@
             </a:r>
           </a:p>
           <a:p>
-            <a:endParaRPr lang="en-US" sz="1600" dirty="0">
-              <a:latin typeface="Courier New"/>
-              <a:cs typeface="Courier New"/>
-            </a:endParaRPr>
-          </a:p>
-          <a:p>
-            <a:r>
-              <a:rPr lang="en-US" sz="1600" dirty="0" smtClean="0">
-                <a:latin typeface="Courier New"/>
-                <a:cs typeface="Courier New"/>
-              </a:rPr>
-              <a:t>.thumbs </a:t>
-            </a:r>
-            <a:r>
-              <a:rPr lang="en-US" sz="1600" dirty="0" err="1" smtClean="0">
-                <a:latin typeface="Courier New"/>
-                <a:cs typeface="Courier New"/>
-              </a:rPr>
-              <a:t>img</a:t>
-            </a:r>
-            <a:r>
-              <a:rPr lang="en-US" sz="1600" dirty="0" smtClean="0">
-                <a:latin typeface="Courier New"/>
-                <a:cs typeface="Courier New"/>
-              </a:rPr>
-              <a:t> {</a:t>
-            </a:r>
-          </a:p>
-          <a:p>
-            <a:r>
-              <a:rPr lang="en-US" sz="1600" dirty="0" smtClean="0">
-                <a:latin typeface="Courier New"/>
-                <a:cs typeface="Courier New"/>
-              </a:rPr>
-              <a:t>  -</a:t>
-            </a:r>
-            <a:r>
-              <a:rPr lang="en-US" sz="1600" dirty="0" err="1" smtClean="0">
-                <a:latin typeface="Courier New"/>
-                <a:cs typeface="Courier New"/>
-              </a:rPr>
-              <a:t>webkit</a:t>
-            </a:r>
-            <a:r>
-              <a:rPr lang="en-US" sz="1600" dirty="0" smtClean="0">
-                <a:latin typeface="Courier New"/>
-                <a:cs typeface="Courier New"/>
-              </a:rPr>
-              <a:t>-transition: all 0.5s;</a:t>
-            </a:r>
-          </a:p>
-          <a:p>
-            <a:r>
-              <a:rPr lang="en-US" sz="1600" dirty="0" smtClean="0">
-                <a:latin typeface="Courier New"/>
-                <a:cs typeface="Courier New"/>
-              </a:rPr>
-              <a:t>  -</a:t>
-            </a:r>
-            <a:r>
-              <a:rPr lang="en-US" sz="1600" dirty="0" err="1" smtClean="0">
-                <a:latin typeface="Courier New"/>
-                <a:cs typeface="Courier New"/>
-              </a:rPr>
-              <a:t>moz</a:t>
-            </a:r>
-            <a:r>
-              <a:rPr lang="en-US" sz="1600" dirty="0" smtClean="0">
-                <a:latin typeface="Courier New"/>
-                <a:cs typeface="Courier New"/>
-              </a:rPr>
-              <a:t>-transition: all 0.5s;</a:t>
-            </a:r>
-          </a:p>
-          <a:p>
-            <a:r>
-              <a:rPr lang="en-US" sz="1600" dirty="0" smtClean="0">
-                <a:latin typeface="Courier New"/>
-                <a:cs typeface="Courier New"/>
-              </a:rPr>
-              <a:t>  -o-transition: all 0.5s;</a:t>
-            </a:r>
-          </a:p>
-          <a:p>
-            <a:r>
-              <a:rPr lang="en-US" sz="1600" dirty="0" smtClean="0">
-                <a:latin typeface="Courier New"/>
-                <a:cs typeface="Courier New"/>
-              </a:rPr>
-              <a:t>  -</a:t>
-            </a:r>
-            <a:r>
-              <a:rPr lang="en-US" sz="1600" dirty="0" err="1" smtClean="0">
-                <a:latin typeface="Courier New"/>
-                <a:cs typeface="Courier New"/>
-              </a:rPr>
-              <a:t>ms</a:t>
-            </a:r>
-            <a:r>
-              <a:rPr lang="en-US" sz="1600" dirty="0" smtClean="0">
-                <a:latin typeface="Courier New"/>
-                <a:cs typeface="Courier New"/>
-              </a:rPr>
-              <a:t>-transition: all 0.5s;</a:t>
-            </a:r>
-          </a:p>
-          <a:p>
-            <a:r>
-              <a:rPr lang="en-US" sz="1600" dirty="0" smtClean="0">
-                <a:latin typeface="Courier New"/>
-                <a:cs typeface="Courier New"/>
-              </a:rPr>
-              <a:t>  transition: all 0.5s;</a:t>
-            </a:r>
-          </a:p>
-          <a:p>
-            <a:r>
-              <a:rPr lang="en-US" sz="1600" dirty="0">
-                <a:latin typeface="Courier New"/>
-                <a:cs typeface="Courier New"/>
-              </a:rPr>
-              <a:t>}</a:t>
-            </a:r>
             <a:endParaRPr lang="en-US" sz="1600" dirty="0" smtClean="0">
               <a:latin typeface="Courier New"/>
               <a:cs typeface="Courier New"/>
             </a:endParaRPr>
           </a:p>
+          <a:p>
+            <a:r>
+              <a:rPr lang="en-US" sz="1600" dirty="0" smtClean="0">
+                <a:latin typeface="Courier New"/>
+                <a:cs typeface="Courier New"/>
+              </a:rPr>
+              <a:t>footer {</a:t>
+            </a:r>
+          </a:p>
+          <a:p>
+            <a:r>
+              <a:rPr lang="en-US" sz="1600" dirty="0">
+                <a:latin typeface="Courier New"/>
+                <a:cs typeface="Courier New"/>
+              </a:rPr>
+              <a:t> </a:t>
+            </a:r>
+            <a:r>
+              <a:rPr lang="en-US" sz="1600" dirty="0" smtClean="0">
+                <a:latin typeface="Courier New"/>
+                <a:cs typeface="Courier New"/>
+              </a:rPr>
+              <a:t> background-color: #FFB873;</a:t>
+            </a:r>
+          </a:p>
+          <a:p>
+            <a:r>
+              <a:rPr lang="en-US" sz="1600" dirty="0">
+                <a:latin typeface="Courier New"/>
+                <a:cs typeface="Courier New"/>
+              </a:rPr>
+              <a:t>}</a:t>
+            </a:r>
+          </a:p>
         </p:txBody>
       </p:sp>
       <p:sp>
@@ -5098,7 +5119,7 @@
     </p:spTree>
     <p:extLst>
       <p:ext uri="{BB962C8B-B14F-4D97-AF65-F5344CB8AC3E}">
-        <p14:creationId xmlns:p14="http://schemas.microsoft.com/office/powerpoint/2010/main" val="350975136"/>
+        <p14:creationId xmlns:p14="http://schemas.microsoft.com/office/powerpoint/2010/main" val="1045098556"/>
       </p:ext>
     </p:extLst>
   </p:cSld>
@@ -5184,7 +5205,7 @@
             <a:pPr algn="ctr"/>
             <a:r>
               <a:rPr lang="en-US" sz="2400" dirty="0" smtClean="0"/>
-              <a:t>Nested Rules</a:t>
+              <a:t>Mix-Ins for sets of related properties</a:t>
             </a:r>
           </a:p>
         </p:txBody>
@@ -5198,7 +5219,7 @@
         <p:spPr>
           <a:xfrm>
             <a:off x="89117" y="2866862"/>
-            <a:ext cx="4485667" cy="2554545"/>
+            <a:ext cx="4485667" cy="3785652"/>
           </a:xfrm>
           <a:prstGeom prst="rect">
             <a:avLst/>
@@ -5216,10 +5237,240 @@
           <a:lstStyle/>
           <a:p>
             <a:r>
+              <a:rPr lang="en-US" sz="1600" dirty="0">
+                <a:latin typeface="Courier New"/>
+                <a:cs typeface="Courier New"/>
+              </a:rPr>
+              <a:t>.</a:t>
+            </a:r>
+            <a:r>
+              <a:rPr lang="en-US" sz="1600" dirty="0" smtClean="0">
+                <a:latin typeface="Courier New"/>
+                <a:cs typeface="Courier New"/>
+              </a:rPr>
+              <a:t>trans(@</a:t>
+            </a:r>
+            <a:r>
               <a:rPr lang="en-US" sz="1600" dirty="0" err="1" smtClean="0">
                 <a:latin typeface="Courier New"/>
                 <a:cs typeface="Courier New"/>
               </a:rPr>
+              <a:t>dur</a:t>
+            </a:r>
+            <a:r>
+              <a:rPr lang="en-US" sz="1600" dirty="0" smtClean="0">
+                <a:latin typeface="Courier New"/>
+                <a:cs typeface="Courier New"/>
+              </a:rPr>
+              <a:t>: 1s) {</a:t>
+            </a:r>
+          </a:p>
+          <a:p>
+            <a:r>
+              <a:rPr lang="en-US" sz="1600" dirty="0" smtClean="0">
+                <a:latin typeface="Courier New"/>
+                <a:cs typeface="Courier New"/>
+              </a:rPr>
+              <a:t>  -</a:t>
+            </a:r>
+            <a:r>
+              <a:rPr lang="en-US" sz="1600" dirty="0" err="1" smtClean="0">
+                <a:latin typeface="Courier New"/>
+                <a:cs typeface="Courier New"/>
+              </a:rPr>
+              <a:t>webkit</a:t>
+            </a:r>
+            <a:r>
+              <a:rPr lang="en-US" sz="1600" dirty="0" smtClean="0">
+                <a:latin typeface="Courier New"/>
+                <a:cs typeface="Courier New"/>
+              </a:rPr>
+              <a:t>-transition: all @</a:t>
+            </a:r>
+            <a:r>
+              <a:rPr lang="en-US" sz="1600" dirty="0" err="1" smtClean="0">
+                <a:latin typeface="Courier New"/>
+                <a:cs typeface="Courier New"/>
+              </a:rPr>
+              <a:t>dur</a:t>
+            </a:r>
+            <a:r>
+              <a:rPr lang="en-US" sz="1600" dirty="0" smtClean="0">
+                <a:latin typeface="Courier New"/>
+                <a:cs typeface="Courier New"/>
+              </a:rPr>
+              <a:t>;</a:t>
+            </a:r>
+          </a:p>
+          <a:p>
+            <a:r>
+              <a:rPr lang="en-US" sz="1600" dirty="0">
+                <a:latin typeface="Courier New"/>
+                <a:cs typeface="Courier New"/>
+              </a:rPr>
+              <a:t> </a:t>
+            </a:r>
+            <a:r>
+              <a:rPr lang="en-US" sz="1600" dirty="0" smtClean="0">
+                <a:latin typeface="Courier New"/>
+                <a:cs typeface="Courier New"/>
+              </a:rPr>
+              <a:t> -</a:t>
+            </a:r>
+            <a:r>
+              <a:rPr lang="en-US" sz="1600" dirty="0" err="1" smtClean="0">
+                <a:latin typeface="Courier New"/>
+                <a:cs typeface="Courier New"/>
+              </a:rPr>
+              <a:t>moz</a:t>
+            </a:r>
+            <a:r>
+              <a:rPr lang="en-US" sz="1600" dirty="0" smtClean="0">
+                <a:latin typeface="Courier New"/>
+                <a:cs typeface="Courier New"/>
+              </a:rPr>
+              <a:t>-transition: all @</a:t>
+            </a:r>
+            <a:r>
+              <a:rPr lang="en-US" sz="1600" dirty="0" err="1" smtClean="0">
+                <a:latin typeface="Courier New"/>
+                <a:cs typeface="Courier New"/>
+              </a:rPr>
+              <a:t>dur</a:t>
+            </a:r>
+            <a:r>
+              <a:rPr lang="en-US" sz="1600" dirty="0" smtClean="0">
+                <a:latin typeface="Courier New"/>
+                <a:cs typeface="Courier New"/>
+              </a:rPr>
+              <a:t>;</a:t>
+            </a:r>
+          </a:p>
+          <a:p>
+            <a:r>
+              <a:rPr lang="en-US" sz="1600" dirty="0">
+                <a:latin typeface="Courier New"/>
+                <a:cs typeface="Courier New"/>
+              </a:rPr>
+              <a:t> </a:t>
+            </a:r>
+            <a:r>
+              <a:rPr lang="en-US" sz="1600" dirty="0" smtClean="0">
+                <a:latin typeface="Courier New"/>
+                <a:cs typeface="Courier New"/>
+              </a:rPr>
+              <a:t> -o-transition: all @</a:t>
+            </a:r>
+            <a:r>
+              <a:rPr lang="en-US" sz="1600" dirty="0" err="1" smtClean="0">
+                <a:latin typeface="Courier New"/>
+                <a:cs typeface="Courier New"/>
+              </a:rPr>
+              <a:t>dur</a:t>
+            </a:r>
+            <a:r>
+              <a:rPr lang="en-US" sz="1600" dirty="0" smtClean="0">
+                <a:latin typeface="Courier New"/>
+                <a:cs typeface="Courier New"/>
+              </a:rPr>
+              <a:t>;</a:t>
+            </a:r>
+          </a:p>
+          <a:p>
+            <a:r>
+              <a:rPr lang="en-US" sz="1600" dirty="0">
+                <a:latin typeface="Courier New"/>
+                <a:cs typeface="Courier New"/>
+              </a:rPr>
+              <a:t> </a:t>
+            </a:r>
+            <a:r>
+              <a:rPr lang="en-US" sz="1600" dirty="0" smtClean="0">
+                <a:latin typeface="Courier New"/>
+                <a:cs typeface="Courier New"/>
+              </a:rPr>
+              <a:t> -</a:t>
+            </a:r>
+            <a:r>
+              <a:rPr lang="en-US" sz="1600" dirty="0" err="1" smtClean="0">
+                <a:latin typeface="Courier New"/>
+                <a:cs typeface="Courier New"/>
+              </a:rPr>
+              <a:t>ms</a:t>
+            </a:r>
+            <a:r>
+              <a:rPr lang="en-US" sz="1600" dirty="0" smtClean="0">
+                <a:latin typeface="Courier New"/>
+                <a:cs typeface="Courier New"/>
+              </a:rPr>
+              <a:t>-transition: all @</a:t>
+            </a:r>
+            <a:r>
+              <a:rPr lang="en-US" sz="1600" dirty="0" err="1" smtClean="0">
+                <a:latin typeface="Courier New"/>
+                <a:cs typeface="Courier New"/>
+              </a:rPr>
+              <a:t>dur</a:t>
+            </a:r>
+            <a:r>
+              <a:rPr lang="en-US" sz="1600" dirty="0" smtClean="0">
+                <a:latin typeface="Courier New"/>
+                <a:cs typeface="Courier New"/>
+              </a:rPr>
+              <a:t>;</a:t>
+            </a:r>
+          </a:p>
+          <a:p>
+            <a:r>
+              <a:rPr lang="en-US" sz="1600" dirty="0">
+                <a:latin typeface="Courier New"/>
+                <a:cs typeface="Courier New"/>
+              </a:rPr>
+              <a:t> </a:t>
+            </a:r>
+            <a:r>
+              <a:rPr lang="en-US" sz="1600" dirty="0" smtClean="0">
+                <a:latin typeface="Courier New"/>
+                <a:cs typeface="Courier New"/>
+              </a:rPr>
+              <a:t> transition: all @</a:t>
+            </a:r>
+            <a:r>
+              <a:rPr lang="en-US" sz="1600" dirty="0" err="1" smtClean="0">
+                <a:latin typeface="Courier New"/>
+                <a:cs typeface="Courier New"/>
+              </a:rPr>
+              <a:t>dur</a:t>
+            </a:r>
+            <a:r>
+              <a:rPr lang="en-US" sz="1600" dirty="0" smtClean="0">
+                <a:latin typeface="Courier New"/>
+                <a:cs typeface="Courier New"/>
+              </a:rPr>
+              <a:t>;</a:t>
+            </a:r>
+          </a:p>
+          <a:p>
+            <a:r>
+              <a:rPr lang="en-US" sz="1600" dirty="0" smtClean="0">
+                <a:latin typeface="Courier New"/>
+                <a:cs typeface="Courier New"/>
+              </a:rPr>
+              <a:t>}</a:t>
+            </a:r>
+          </a:p>
+          <a:p>
+            <a:endParaRPr lang="en-US" sz="1600" dirty="0">
+              <a:latin typeface="Courier New"/>
+              <a:cs typeface="Courier New"/>
+            </a:endParaRPr>
+          </a:p>
+          <a:p>
+            <a:r>
+              <a:rPr lang="en-US" sz="1600" dirty="0" err="1" smtClean="0">
+                <a:latin typeface="Courier New"/>
+                <a:cs typeface="Courier New"/>
+              </a:rPr>
               <a:t>nav</a:t>
             </a:r>
             <a:r>
@@ -5227,6 +5478,67 @@
                 <a:latin typeface="Courier New"/>
                 <a:cs typeface="Courier New"/>
               </a:rPr>
+              <a:t> a {</a:t>
+            </a:r>
+          </a:p>
+          <a:p>
+            <a:r>
+              <a:rPr lang="en-US" sz="1600" dirty="0">
+                <a:latin typeface="Courier New"/>
+                <a:cs typeface="Courier New"/>
+              </a:rPr>
+              <a:t> </a:t>
+            </a:r>
+            <a:r>
+              <a:rPr lang="en-US" sz="1600" dirty="0" smtClean="0">
+                <a:latin typeface="Courier New"/>
+                <a:cs typeface="Courier New"/>
+              </a:rPr>
+              <a:t> .trans;</a:t>
+            </a:r>
+          </a:p>
+          <a:p>
+            <a:r>
+              <a:rPr lang="en-US" sz="1600" dirty="0" smtClean="0">
+                <a:latin typeface="Courier New"/>
+                <a:cs typeface="Courier New"/>
+              </a:rPr>
+              <a:t>}</a:t>
+            </a:r>
+          </a:p>
+          <a:p>
+            <a:endParaRPr lang="en-US" sz="1600" dirty="0">
+              <a:latin typeface="Courier New"/>
+              <a:cs typeface="Courier New"/>
+            </a:endParaRPr>
+          </a:p>
+          <a:p>
+            <a:r>
+              <a:rPr lang="en-US" sz="1600" dirty="0">
+                <a:latin typeface="Courier New"/>
+                <a:cs typeface="Courier New"/>
+              </a:rPr>
+              <a:t>.</a:t>
+            </a:r>
+            <a:r>
+              <a:rPr lang="en-US" sz="1600" dirty="0" smtClean="0">
+                <a:latin typeface="Courier New"/>
+                <a:cs typeface="Courier New"/>
+              </a:rPr>
+              <a:t>thumbs </a:t>
+            </a:r>
+            <a:r>
+              <a:rPr lang="en-US" sz="1600" dirty="0" err="1" smtClean="0">
+                <a:latin typeface="Courier New"/>
+                <a:cs typeface="Courier New"/>
+              </a:rPr>
+              <a:t>img</a:t>
+            </a:r>
+            <a:r>
+              <a:rPr lang="en-US" sz="1600" dirty="0" smtClean="0">
+                <a:latin typeface="Courier New"/>
+                <a:cs typeface="Courier New"/>
+              </a:rPr>
               <a:t> {</a:t>
             </a:r>
           </a:p>
@@ -5243,112 +5555,7 @@
                 <a:latin typeface="Courier New"/>
                 <a:cs typeface="Courier New"/>
               </a:rPr>
-              <a:t> background-color: #CCC;</a:t>
-            </a:r>
-          </a:p>
-          <a:p>
-            <a:r>
-              <a:rPr lang="en-US" sz="1600" dirty="0">
-                <a:latin typeface="Courier New"/>
-                <a:cs typeface="Courier New"/>
-              </a:rPr>
-              <a:t> </a:t>
-            </a:r>
-            <a:r>
-              <a:rPr lang="en-US" sz="1600" dirty="0" smtClean="0">
-                <a:latin typeface="Courier New"/>
-                <a:cs typeface="Courier New"/>
-              </a:rPr>
-              <a:t> li {</a:t>
-            </a:r>
-          </a:p>
-          <a:p>
-            <a:r>
-              <a:rPr lang="en-US" sz="1600" dirty="0">
-                <a:latin typeface="Courier New"/>
-                <a:cs typeface="Courier New"/>
-              </a:rPr>
-              <a:t> </a:t>
-            </a:r>
-            <a:r>
-              <a:rPr lang="en-US" sz="1600" dirty="0" smtClean="0">
-                <a:latin typeface="Courier New"/>
-                <a:cs typeface="Courier New"/>
-              </a:rPr>
-              <a:t>   display: inline-block;</a:t>
-            </a:r>
-          </a:p>
-          <a:p>
-            <a:r>
-              <a:rPr lang="en-US" sz="1600" dirty="0" smtClean="0">
-                <a:latin typeface="Courier New"/>
-                <a:cs typeface="Courier New"/>
-              </a:rPr>
-              <a:t>  }</a:t>
-            </a:r>
-          </a:p>
-          <a:p>
-            <a:r>
-              <a:rPr lang="en-US" sz="1600" dirty="0">
-                <a:latin typeface="Courier New"/>
-                <a:cs typeface="Courier New"/>
-              </a:rPr>
-              <a:t> </a:t>
-            </a:r>
-            <a:r>
-              <a:rPr lang="en-US" sz="1600" dirty="0" smtClean="0">
-                <a:latin typeface="Courier New"/>
-                <a:cs typeface="Courier New"/>
-              </a:rPr>
-              <a:t> a {</a:t>
-            </a:r>
-          </a:p>
-          <a:p>
-            <a:r>
-              <a:rPr lang="en-US" sz="1600" dirty="0">
-                <a:latin typeface="Courier New"/>
-                <a:cs typeface="Courier New"/>
-              </a:rPr>
-              <a:t> </a:t>
-            </a:r>
-            <a:r>
-              <a:rPr lang="en-US" sz="1600" dirty="0" smtClean="0">
-                <a:latin typeface="Courier New"/>
-                <a:cs typeface="Courier New"/>
-              </a:rPr>
-              <a:t>   display: inline-block;</a:t>
-            </a:r>
-          </a:p>
-          <a:p>
-            <a:r>
-              <a:rPr lang="en-US" sz="1600" dirty="0">
-                <a:latin typeface="Courier New"/>
-                <a:cs typeface="Courier New"/>
-              </a:rPr>
-              <a:t> </a:t>
-            </a:r>
-            <a:r>
-              <a:rPr lang="en-US" sz="1600" dirty="0" smtClean="0">
-                <a:latin typeface="Courier New"/>
-                <a:cs typeface="Courier New"/>
-              </a:rPr>
-              <a:t>   padding: 1em;</a:t>
-            </a:r>
-          </a:p>
-          <a:p>
-            <a:r>
-              <a:rPr lang="en-US" sz="1600" dirty="0">
-                <a:latin typeface="Courier New"/>
-                <a:cs typeface="Courier New"/>
-              </a:rPr>
-              <a:t> </a:t>
-            </a:r>
-            <a:r>
-              <a:rPr lang="en-US" sz="1600" dirty="0" smtClean="0">
-                <a:latin typeface="Courier New"/>
-                <a:cs typeface="Courier New"/>
-              </a:rPr>
-              <a:t> }</a:t>
+              <a:t> .trans(0.5s);</a:t>
             </a:r>
           </a:p>
           <a:p>
@@ -5375,7 +5582,7 @@
         <p:spPr>
           <a:xfrm>
             <a:off x="89117" y="2428662"/>
-            <a:ext cx="2864148" cy="369332"/>
+            <a:ext cx="3256295" cy="369332"/>
           </a:xfrm>
           <a:prstGeom prst="rect">
             <a:avLst/>
@@ -5390,7 +5597,15 @@
           <a:p>
             <a:r>
               <a:rPr lang="en-US" dirty="0" smtClean="0"/>
-              <a:t>SASS and LESS (same syntax)</a:t>
+              <a:t>LESS (</a:t>
+            </a:r>
+            <a:r>
+              <a:rPr lang="en-US" sz="1400" i="1" dirty="0" smtClean="0"/>
+              <a:t>SASS uses slightly different syntax</a:t>
+            </a:r>
+            <a:r>
+              <a:rPr lang="en-US" dirty="0" smtClean="0"/>
+              <a:t>)</a:t>
             </a:r>
             <a:endParaRPr lang="en-US" dirty="0"/>
           </a:p>
@@ -5405,7 +5620,7 @@
         <p:spPr>
           <a:xfrm>
             <a:off x="4606344" y="2866862"/>
-            <a:ext cx="4485667" cy="3046988"/>
+            <a:ext cx="4485667" cy="3785652"/>
           </a:xfrm>
           <a:prstGeom prst="rect">
             <a:avLst/>
@@ -5434,156 +5649,241 @@
                 <a:latin typeface="Courier New"/>
                 <a:cs typeface="Courier New"/>
               </a:rPr>
+              <a:t> a {</a:t>
+            </a:r>
+          </a:p>
+          <a:p>
+            <a:r>
+              <a:rPr lang="en-US" sz="1600" dirty="0">
+                <a:latin typeface="Courier New"/>
+                <a:cs typeface="Courier New"/>
+              </a:rPr>
+              <a:t> </a:t>
+            </a:r>
+            <a:r>
+              <a:rPr lang="en-US" sz="1600" dirty="0" smtClean="0">
+                <a:latin typeface="Courier New"/>
+                <a:cs typeface="Courier New"/>
+              </a:rPr>
+              <a:t> -</a:t>
+            </a:r>
+            <a:r>
+              <a:rPr lang="en-US" sz="1600" dirty="0" err="1" smtClean="0">
+                <a:latin typeface="Courier New"/>
+                <a:cs typeface="Courier New"/>
+              </a:rPr>
+              <a:t>webkit</a:t>
+            </a:r>
+            <a:r>
+              <a:rPr lang="en-US" sz="1600" dirty="0" smtClean="0">
+                <a:latin typeface="Courier New"/>
+                <a:cs typeface="Courier New"/>
+              </a:rPr>
+              <a:t>-transition: all 1s;</a:t>
+            </a:r>
+          </a:p>
+          <a:p>
+            <a:r>
+              <a:rPr lang="en-US" sz="1600" dirty="0" smtClean="0">
+                <a:latin typeface="Courier New"/>
+                <a:cs typeface="Courier New"/>
+              </a:rPr>
+              <a:t>  -</a:t>
+            </a:r>
+            <a:r>
+              <a:rPr lang="en-US" sz="1600" dirty="0" err="1" smtClean="0">
+                <a:latin typeface="Courier New"/>
+                <a:cs typeface="Courier New"/>
+              </a:rPr>
+              <a:t>moz</a:t>
+            </a:r>
+            <a:r>
+              <a:rPr lang="en-US" sz="1600" dirty="0" smtClean="0">
+                <a:latin typeface="Courier New"/>
+                <a:cs typeface="Courier New"/>
+              </a:rPr>
+              <a:t>-transition: all 1s;</a:t>
+            </a:r>
+          </a:p>
+          <a:p>
+            <a:r>
+              <a:rPr lang="en-US" sz="1600" dirty="0" smtClean="0">
+                <a:latin typeface="Courier New"/>
+                <a:cs typeface="Courier New"/>
+              </a:rPr>
+              <a:t>  -o-transition: all 1s;</a:t>
+            </a:r>
+          </a:p>
+          <a:p>
+            <a:r>
+              <a:rPr lang="en-US" sz="1600" dirty="0" smtClean="0">
+                <a:latin typeface="Courier New"/>
+                <a:cs typeface="Courier New"/>
+              </a:rPr>
+              <a:t>  -</a:t>
+            </a:r>
+            <a:r>
+              <a:rPr lang="en-US" sz="1600" dirty="0" err="1" smtClean="0">
+                <a:latin typeface="Courier New"/>
+                <a:cs typeface="Courier New"/>
+              </a:rPr>
+              <a:t>ms</a:t>
+            </a:r>
+            <a:r>
+              <a:rPr lang="en-US" sz="1600" dirty="0" smtClean="0">
+                <a:latin typeface="Courier New"/>
+                <a:cs typeface="Courier New"/>
+              </a:rPr>
+              <a:t>-transition: all 1s;</a:t>
+            </a:r>
+          </a:p>
+          <a:p>
+            <a:r>
+              <a:rPr lang="en-US" sz="1600" dirty="0" smtClean="0">
+                <a:latin typeface="Courier New"/>
+                <a:cs typeface="Courier New"/>
+              </a:rPr>
+              <a:t>  transition: all 1s;</a:t>
+            </a:r>
+          </a:p>
+          <a:p>
+            <a:r>
+              <a:rPr lang="en-US" sz="1600" dirty="0" smtClean="0">
+                <a:latin typeface="Courier New"/>
+                <a:cs typeface="Courier New"/>
+              </a:rPr>
+              <a:t>}</a:t>
+            </a:r>
+          </a:p>
+          <a:p>
+            <a:endParaRPr lang="en-US" sz="1600" dirty="0">
+              <a:latin typeface="Courier New"/>
+              <a:cs typeface="Courier New"/>
+            </a:endParaRPr>
+          </a:p>
+          <a:p>
+            <a:r>
+              <a:rPr lang="en-US" sz="1600" dirty="0" smtClean="0">
+                <a:latin typeface="Courier New"/>
+                <a:cs typeface="Courier New"/>
+              </a:rPr>
+              <a:t>.thumbs </a:t>
+            </a:r>
+            <a:r>
+              <a:rPr lang="en-US" sz="1600" dirty="0" err="1" smtClean="0">
+                <a:latin typeface="Courier New"/>
+                <a:cs typeface="Courier New"/>
+              </a:rPr>
+              <a:t>img</a:t>
+            </a:r>
+            <a:r>
+              <a:rPr lang="en-US" sz="1600" dirty="0" smtClean="0">
+                <a:latin typeface="Courier New"/>
+                <a:cs typeface="Courier New"/>
+              </a:rPr>
               <a:t> {</a:t>
             </a:r>
           </a:p>
           <a:p>
             <a:r>
+              <a:rPr lang="en-US" sz="1600" dirty="0" smtClean="0">
+                <a:latin typeface="Courier New"/>
+                <a:cs typeface="Courier New"/>
+              </a:rPr>
+              <a:t>  -</a:t>
+            </a:r>
+            <a:r>
+              <a:rPr lang="en-US" sz="1600" dirty="0" err="1" smtClean="0">
+                <a:latin typeface="Courier New"/>
+                <a:cs typeface="Courier New"/>
+              </a:rPr>
+              <a:t>webkit</a:t>
+            </a:r>
+            <a:r>
+              <a:rPr lang="en-US" sz="1600" dirty="0" smtClean="0">
+                <a:latin typeface="Courier New"/>
+                <a:cs typeface="Courier New"/>
+              </a:rPr>
+              <a:t>-transition: all 0.5s;</a:t>
+            </a:r>
+          </a:p>
+          <a:p>
+            <a:r>
+              <a:rPr lang="en-US" sz="1600" dirty="0" smtClean="0">
+                <a:latin typeface="Courier New"/>
+                <a:cs typeface="Courier New"/>
+              </a:rPr>
+              <a:t>  -</a:t>
+            </a:r>
+            <a:r>
+              <a:rPr lang="en-US" sz="1600" dirty="0" err="1" smtClean="0">
+                <a:latin typeface="Courier New"/>
+                <a:cs typeface="Courier New"/>
+              </a:rPr>
+              <a:t>moz</a:t>
+            </a:r>
+            <a:r>
+              <a:rPr lang="en-US" sz="1600" dirty="0" smtClean="0">
+                <a:latin typeface="Courier New"/>
+                <a:cs typeface="Courier New"/>
+              </a:rPr>
+              <a:t>-transition: all 0.5s;</a:t>
+            </a:r>
+          </a:p>
+          <a:p>
+            <a:r>
+              <a:rPr lang="en-US" sz="1600" dirty="0" smtClean="0">
+                <a:latin typeface="Courier New"/>
+                <a:cs typeface="Courier New"/>
+              </a:rPr>
+              <a:t>  -o-transition: all 0.5s;</a:t>
+            </a:r>
+          </a:p>
+          <a:p>
+            <a:r>
+              <a:rPr lang="en-US" sz="1600" dirty="0" smtClean="0">
+                <a:latin typeface="Courier New"/>
+                <a:cs typeface="Courier New"/>
+              </a:rPr>
+              <a:t>  -</a:t>
+            </a:r>
+            <a:r>
+              <a:rPr lang="en-US" sz="1600" dirty="0" err="1" smtClean="0">
+                <a:latin typeface="Courier New"/>
+                <a:cs typeface="Courier New"/>
+              </a:rPr>
+              <a:t>ms</a:t>
+            </a:r>
+            <a:r>
+              <a:rPr lang="en-US" sz="1600" dirty="0" smtClean="0">
+                <a:latin typeface="Courier New"/>
+                <a:cs typeface="Courier New"/>
+              </a:rPr>
+              <a:t>-transition: all 0.5s;</a:t>
+            </a:r>
+          </a:p>
+          <a:p>
+            <a:r>
+              <a:rPr lang="en-US" sz="1600" dirty="0" smtClean="0">
+                <a:latin typeface="Courier New"/>
+                <a:cs typeface="Courier New"/>
+              </a:rPr>
+              <a:t>  transition: all 0.5s;</a:t>
+            </a:r>
+          </a:p>
+          <a:p>
+            <a:r>
               <a:rPr lang="en-US" sz="1600" dirty="0">
                 <a:latin typeface="Courier New"/>
                 <a:cs typeface="Courier New"/>
               </a:rPr>
-              <a:t> </a:t>
-            </a:r>
-            <a:r>
-              <a:rPr lang="en-US" sz="1600" dirty="0" smtClean="0">
-                <a:latin typeface="Courier New"/>
-                <a:cs typeface="Courier New"/>
-              </a:rPr>
-              <a:t> background-color: #CCC;</a:t>
+              <a:t>}</a:t>
             </a:r>
             <a:endParaRPr lang="en-US" sz="1600" dirty="0" smtClean="0">
               <a:latin typeface="Courier New"/>
               <a:cs typeface="Courier New"/>
             </a:endParaRPr>
           </a:p>
-          <a:p>
-            <a:r>
-              <a:rPr lang="en-US" sz="1600" dirty="0" smtClean="0">
-                <a:latin typeface="Courier New"/>
-                <a:cs typeface="Courier New"/>
-              </a:rPr>
-              <a:t>}</a:t>
-            </a:r>
-          </a:p>
-          <a:p>
-            <a:endParaRPr lang="en-US" sz="1600" dirty="0">
-              <a:latin typeface="Courier New"/>
-              <a:cs typeface="Courier New"/>
-            </a:endParaRPr>
-          </a:p>
-          <a:p>
-            <a:r>
-              <a:rPr lang="en-US" sz="1600" dirty="0" err="1" smtClean="0">
-                <a:latin typeface="Courier New"/>
-                <a:cs typeface="Courier New"/>
-              </a:rPr>
-              <a:t>nav</a:t>
-            </a:r>
-            <a:r>
-              <a:rPr lang="en-US" sz="1600" dirty="0" smtClean="0">
-                <a:latin typeface="Courier New"/>
-                <a:cs typeface="Courier New"/>
-              </a:rPr>
-              <a:t> li {</a:t>
-            </a:r>
-          </a:p>
-          <a:p>
-            <a:r>
-              <a:rPr lang="en-US" sz="1600" dirty="0">
-                <a:latin typeface="Courier New"/>
-                <a:cs typeface="Courier New"/>
-              </a:rPr>
-              <a:t> </a:t>
-            </a:r>
-            <a:r>
-              <a:rPr lang="en-US" sz="1600" dirty="0" smtClean="0">
-                <a:latin typeface="Courier New"/>
-                <a:cs typeface="Courier New"/>
-              </a:rPr>
-              <a:t> display: inline-block;</a:t>
-            </a:r>
-            <a:endParaRPr lang="en-US" sz="1600" dirty="0" smtClean="0">
-              <a:latin typeface="Courier New"/>
-              <a:cs typeface="Courier New"/>
-            </a:endParaRPr>
-          </a:p>
-          <a:p>
-            <a:r>
-              <a:rPr lang="en-US" sz="1600" dirty="0" smtClean="0">
-                <a:latin typeface="Courier New"/>
-                <a:cs typeface="Courier New"/>
-              </a:rPr>
-              <a:t>}</a:t>
-            </a:r>
-          </a:p>
-          <a:p>
-            <a:endParaRPr lang="en-US" sz="1600" dirty="0">
-              <a:latin typeface="Courier New"/>
-              <a:cs typeface="Courier New"/>
-            </a:endParaRPr>
-          </a:p>
-          <a:p>
-            <a:r>
-              <a:rPr lang="en-US" sz="1600" dirty="0" err="1" smtClean="0">
-                <a:latin typeface="Courier New"/>
-                <a:cs typeface="Courier New"/>
-              </a:rPr>
-              <a:t>nav</a:t>
-            </a:r>
-            <a:r>
-              <a:rPr lang="en-US" sz="1600" dirty="0" smtClean="0">
-                <a:latin typeface="Courier New"/>
-                <a:cs typeface="Courier New"/>
-              </a:rPr>
-              <a:t> a {</a:t>
-            </a:r>
-          </a:p>
-          <a:p>
-            <a:r>
-              <a:rPr lang="en-US" sz="1600" dirty="0">
-                <a:latin typeface="Courier New"/>
-                <a:cs typeface="Courier New"/>
-              </a:rPr>
-              <a:t> </a:t>
-            </a:r>
-            <a:r>
-              <a:rPr lang="en-US" sz="1600" dirty="0" smtClean="0">
-                <a:latin typeface="Courier New"/>
-                <a:cs typeface="Courier New"/>
-              </a:rPr>
-              <a:t> display: inline-block;</a:t>
-            </a:r>
-          </a:p>
-          <a:p>
-            <a:r>
-              <a:rPr lang="en-US" sz="1600" dirty="0">
-                <a:latin typeface="Courier New"/>
-                <a:cs typeface="Courier New"/>
-              </a:rPr>
-              <a:t> </a:t>
-            </a:r>
-            <a:r>
-              <a:rPr lang="en-US" sz="1600" dirty="0" smtClean="0">
-                <a:latin typeface="Courier New"/>
-                <a:cs typeface="Courier New"/>
-              </a:rPr>
-              <a:t> padding: 1em;</a:t>
-            </a:r>
-          </a:p>
-          <a:p>
-            <a:r>
-              <a:rPr lang="en-US" sz="1600" dirty="0">
-                <a:latin typeface="Courier New"/>
-                <a:cs typeface="Courier New"/>
-              </a:rPr>
-              <a:t>}</a:t>
-            </a:r>
-            <a:endParaRPr lang="en-US" sz="1600" dirty="0" smtClean="0">
-              <a:latin typeface="Courier New"/>
-              <a:cs typeface="Courier New"/>
-            </a:endParaRPr>
-          </a:p>
         </p:txBody>
       </p:sp>
       <p:sp>
@@ -5619,7 +5919,7 @@
     </p:spTree>
     <p:extLst>
       <p:ext uri="{BB962C8B-B14F-4D97-AF65-F5344CB8AC3E}">
-        <p14:creationId xmlns:p14="http://schemas.microsoft.com/office/powerpoint/2010/main" val="3342147257"/>
+        <p14:creationId xmlns:p14="http://schemas.microsoft.com/office/powerpoint/2010/main" val="350975136"/>
       </p:ext>
     </p:extLst>
   </p:cSld>
@@ -5705,7 +6005,7 @@
             <a:pPr algn="ctr"/>
             <a:r>
               <a:rPr lang="en-US" sz="2400" dirty="0" smtClean="0"/>
-              <a:t>Rule Inheritance</a:t>
+              <a:t>Nested Rules</a:t>
             </a:r>
           </a:p>
         </p:txBody>
@@ -5719,7 +6019,7 @@
         <p:spPr>
           <a:xfrm>
             <a:off x="89117" y="2866862"/>
-            <a:ext cx="4485667" cy="3539430"/>
+            <a:ext cx="4485667" cy="2554545"/>
           </a:xfrm>
           <a:prstGeom prst="rect">
             <a:avLst/>
@@ -5737,11 +6037,18 @@
           <a:lstStyle/>
           <a:p>
             <a:r>
-              <a:rPr lang="en-US" sz="1600" dirty="0" smtClean="0">
-                <a:latin typeface="Courier New"/>
-                <a:cs typeface="Courier New"/>
-              </a:rPr>
-              <a:t>.headings {</a:t>
+              <a:rPr lang="en-US" sz="1600" dirty="0" err="1" smtClean="0">
+                <a:latin typeface="Courier New"/>
+                <a:cs typeface="Courier New"/>
+              </a:rPr>
+              <a:t>nav</a:t>
+            </a:r>
+            <a:r>
+              <a:rPr lang="en-US" sz="1600" dirty="0" smtClean="0">
+                <a:latin typeface="Courier New"/>
+                <a:cs typeface="Courier New"/>
+              </a:rPr>
+              <a:t> {</a:t>
             </a:r>
           </a:p>
           <a:p>
@@ -5757,7 +6064,7 @@
                 <a:latin typeface="Courier New"/>
                 <a:cs typeface="Courier New"/>
               </a:rPr>
-              <a:t> font-family: Arial, sans-serif;</a:t>
+              <a:t> background-color: #CCC;</a:t>
             </a:r>
           </a:p>
           <a:p>
@@ -5773,7 +6080,7 @@
                 <a:latin typeface="Courier New"/>
                 <a:cs typeface="Courier New"/>
               </a:rPr>
-              <a:t> font-weight: bold;</a:t>
+              <a:t> li {</a:t>
             </a:r>
           </a:p>
           <a:p>
@@ -5789,7 +6096,16 @@
                 <a:latin typeface="Courier New"/>
                 <a:cs typeface="Courier New"/>
               </a:rPr>
-              <a:t> color: #0E0E0E;</a:t>
+              <a:t>   display: inline-block;</a:t>
+            </a:r>
+          </a:p>
+          <a:p>
+            <a:r>
+              <a:rPr lang="en-US" sz="1600" dirty="0" smtClean="0">
+                <a:latin typeface="Courier New"/>
+                <a:cs typeface="Courier New"/>
+              </a:rPr>
+              <a:t>  }</a:t>
             </a:r>
           </a:p>
           <a:p>
@@ -5805,102 +6121,70 @@
                 <a:latin typeface="Courier New"/>
                 <a:cs typeface="Courier New"/>
               </a:rPr>
-              <a:t> margin-bottom: 0.5em;</a:t>
-            </a:r>
-          </a:p>
-          <a:p>
-            <a:r>
-              <a:rPr lang="en-US" sz="1600" dirty="0" smtClean="0">
+              <a:t> a {</a:t>
+            </a:r>
+          </a:p>
+          <a:p>
+            <a:r>
+              <a:rPr lang="en-US" sz="1600" dirty="0">
+                <a:latin typeface="Courier New"/>
+                <a:cs typeface="Courier New"/>
+              </a:rPr>
+              <a:t> </a:t>
+            </a:r>
+            <a:r>
+              <a:rPr lang="en-US" sz="1600" dirty="0" smtClean="0">
+                <a:latin typeface="Courier New"/>
+                <a:cs typeface="Courier New"/>
+              </a:rPr>
+              <a:t>   display: inline-block;</a:t>
+            </a:r>
+          </a:p>
+          <a:p>
+            <a:r>
+              <a:rPr lang="en-US" sz="1600" dirty="0">
+                <a:latin typeface="Courier New"/>
+                <a:cs typeface="Courier New"/>
+              </a:rPr>
+              <a:t> </a:t>
+            </a:r>
+            <a:r>
+              <a:rPr lang="en-US" sz="1600" dirty="0" smtClean="0">
+                <a:latin typeface="Courier New"/>
+                <a:cs typeface="Courier New"/>
+              </a:rPr>
+              <a:t>   padding: 1em;</a:t>
+            </a:r>
+          </a:p>
+          <a:p>
+            <a:r>
+              <a:rPr lang="en-US" sz="1600" dirty="0">
+                <a:latin typeface="Courier New"/>
+                <a:cs typeface="Courier New"/>
+              </a:rPr>
+              <a:t> </a:t>
+            </a:r>
+            <a:r>
+              <a:rPr lang="en-US" sz="1600" dirty="0" smtClean="0">
+                <a:latin typeface="Courier New"/>
+                <a:cs typeface="Courier New"/>
+              </a:rPr>
+              <a:t> }</a:t>
+            </a:r>
+          </a:p>
+          <a:p>
+            <a:r>
+              <a:rPr lang="en-US" sz="1600" dirty="0">
                 <a:latin typeface="Courier New"/>
                 <a:cs typeface="Courier New"/>
               </a:rPr>
               <a:t>}</a:t>
             </a:r>
-          </a:p>
-          <a:p>
             <a:endParaRPr lang="en-US" sz="1600" dirty="0" smtClean="0">
               <a:latin typeface="Courier New"/>
               <a:cs typeface="Courier New"/>
             </a:endParaRPr>
           </a:p>
-          <a:p>
-            <a:r>
-              <a:rPr lang="en-US" sz="1600" dirty="0" smtClean="0">
-                <a:latin typeface="Courier New"/>
-                <a:cs typeface="Courier New"/>
-              </a:rPr>
-              <a:t>h1:extend(.headings) {</a:t>
-            </a:r>
-          </a:p>
-          <a:p>
-            <a:r>
-              <a:rPr lang="en-US" sz="1600" dirty="0">
-                <a:latin typeface="Courier New"/>
-                <a:cs typeface="Courier New"/>
-              </a:rPr>
-              <a:t> </a:t>
-            </a:r>
-            <a:r>
-              <a:rPr lang="en-US" sz="1600" dirty="0" smtClean="0">
-                <a:latin typeface="Courier New"/>
-                <a:cs typeface="Courier New"/>
-              </a:rPr>
-              <a:t> font-size: 200%;</a:t>
-            </a:r>
-          </a:p>
-          <a:p>
-            <a:r>
-              <a:rPr lang="en-US" sz="1600" dirty="0" smtClean="0">
-                <a:latin typeface="Courier New"/>
-                <a:cs typeface="Courier New"/>
-              </a:rPr>
-              <a:t>}</a:t>
-            </a:r>
-          </a:p>
-          <a:p>
-            <a:endParaRPr lang="en-US" sz="1600" dirty="0">
-              <a:latin typeface="Courier New"/>
-              <a:cs typeface="Courier New"/>
-            </a:endParaRPr>
-          </a:p>
-          <a:p>
-            <a:r>
-              <a:rPr lang="en-US" sz="1600" dirty="0" smtClean="0">
-                <a:latin typeface="Courier New"/>
-                <a:cs typeface="Courier New"/>
-              </a:rPr>
-              <a:t>h2:extend(.headings) {</a:t>
-            </a:r>
-          </a:p>
-          <a:p>
-            <a:r>
-              <a:rPr lang="en-US" sz="1600" dirty="0">
-                <a:latin typeface="Courier New"/>
-                <a:cs typeface="Courier New"/>
-              </a:rPr>
-              <a:t> </a:t>
-            </a:r>
-            <a:r>
-              <a:rPr lang="en-US" sz="1600" dirty="0" smtClean="0">
-                <a:latin typeface="Courier New"/>
-                <a:cs typeface="Courier New"/>
-              </a:rPr>
-              <a:t> font-size: 150%;</a:t>
-            </a:r>
-          </a:p>
-          <a:p>
-            <a:r>
-              <a:rPr lang="en-US" sz="1600" dirty="0">
-                <a:latin typeface="Courier New"/>
-                <a:cs typeface="Courier New"/>
-              </a:rPr>
-              <a:t>}</a:t>
-            </a:r>
-            <a:endParaRPr lang="en-US" sz="1600" dirty="0" smtClean="0">
-              <a:latin typeface="Courier New"/>
-              <a:cs typeface="Courier New"/>
-            </a:endParaRPr>
-          </a:p>
         </p:txBody>
       </p:sp>
       <p:sp>
@@ -5912,7 +6196,7 @@
         <p:spPr>
           <a:xfrm>
             <a:off x="89117" y="2428662"/>
-            <a:ext cx="3241217" cy="369332"/>
+            <a:ext cx="2864148" cy="369332"/>
           </a:xfrm>
           <a:prstGeom prst="rect">
             <a:avLst/>
@@ -5927,19 +6211,7 @@
           <a:p>
             <a:r>
               <a:rPr lang="en-US" dirty="0" smtClean="0"/>
-              <a:t>LESS </a:t>
-            </a:r>
-            <a:r>
-              <a:rPr lang="en-US" dirty="0" smtClean="0"/>
-              <a:t>(</a:t>
-            </a:r>
-            <a:r>
-              <a:rPr lang="en-US" sz="1400" i="1" dirty="0" smtClean="0"/>
-              <a:t>SASS uses slightly different syntax</a:t>
-            </a:r>
-            <a:r>
-              <a:rPr lang="en-US" dirty="0" smtClean="0"/>
-              <a:t>)</a:t>
+              <a:t>SASS and LESS (same syntax)</a:t>
             </a:r>
             <a:endParaRPr lang="en-US" dirty="0"/>
           </a:p>
@@ -5954,7 +6226,7 @@
         <p:spPr>
           <a:xfrm>
             <a:off x="4606344" y="2866862"/>
-            <a:ext cx="4485667" cy="3539430"/>
+            <a:ext cx="4485667" cy="3046988"/>
           </a:xfrm>
           <a:prstGeom prst="rect">
             <a:avLst/>
@@ -5972,11 +6244,18 @@
           <a:lstStyle/>
           <a:p>
             <a:r>
-              <a:rPr lang="en-US" sz="1600" dirty="0" smtClean="0">
-                <a:latin typeface="Courier New"/>
-                <a:cs typeface="Courier New"/>
-              </a:rPr>
-              <a:t>h1, h2 {</a:t>
+              <a:rPr lang="en-US" sz="1600" dirty="0" err="1" smtClean="0">
+                <a:latin typeface="Courier New"/>
+                <a:cs typeface="Courier New"/>
+              </a:rPr>
+              <a:t>nav</a:t>
+            </a:r>
+            <a:r>
+              <a:rPr lang="en-US" sz="1600" dirty="0" smtClean="0">
+                <a:latin typeface="Courier New"/>
+                <a:cs typeface="Courier New"/>
+              </a:rPr>
+              <a:t> {</a:t>
             </a:r>
           </a:p>
           <a:p>
@@ -5992,41 +6271,7 @@
                 <a:latin typeface="Courier New"/>
                 <a:cs typeface="Courier New"/>
               </a:rPr>
-              <a:t> </a:t>
-            </a:r>
-            <a:r>
-              <a:rPr lang="en-US" sz="1600" dirty="0" smtClean="0">
-                <a:latin typeface="Courier New"/>
-                <a:cs typeface="Courier New"/>
-              </a:rPr>
-              <a:t>font-family: Arial, sans-serif;</a:t>
-            </a:r>
-          </a:p>
-          <a:p>
-            <a:r>
-              <a:rPr lang="en-US" sz="1600" dirty="0" smtClean="0">
-                <a:latin typeface="Courier New"/>
-                <a:cs typeface="Courier New"/>
-              </a:rPr>
-              <a:t>  font-weight: bold;</a:t>
-            </a:r>
-          </a:p>
-          <a:p>
-            <a:r>
-              <a:rPr lang="en-US" sz="1600" dirty="0" smtClean="0">
-                <a:latin typeface="Courier New"/>
-                <a:cs typeface="Courier New"/>
-              </a:rPr>
-              <a:t>  color: #0E0E0E;</a:t>
-            </a:r>
-          </a:p>
-          <a:p>
-            <a:r>
-              <a:rPr lang="en-US" sz="1600" dirty="0" smtClean="0">
-                <a:latin typeface="Courier New"/>
-                <a:cs typeface="Courier New"/>
-              </a:rPr>
-              <a:t>  margin-bottom: 0.5em;</a:t>
+              <a:t> background-color: #CCC;</a:t>
             </a:r>
           </a:p>
           <a:p>
@@ -6046,11 +6291,18 @@
           </a:p>
           <a:p>
             <a:r>
-              <a:rPr lang="en-US" sz="1600" dirty="0" smtClean="0">
-                <a:latin typeface="Courier New"/>
-                <a:cs typeface="Courier New"/>
-              </a:rPr>
-              <a:t>h1 {</a:t>
+              <a:rPr lang="en-US" sz="1600" dirty="0" err="1" smtClean="0">
+                <a:latin typeface="Courier New"/>
+                <a:cs typeface="Courier New"/>
+              </a:rPr>
+              <a:t>nav</a:t>
+            </a:r>
+            <a:r>
+              <a:rPr lang="en-US" sz="1600" dirty="0" smtClean="0">
+                <a:latin typeface="Courier New"/>
+                <a:cs typeface="Courier New"/>
+              </a:rPr>
+              <a:t> li {</a:t>
             </a:r>
           </a:p>
           <a:p>
@@ -6066,7 +6318,7 @@
                 <a:latin typeface="Courier New"/>
                 <a:cs typeface="Courier New"/>
               </a:rPr>
-              <a:t> font-size: 200%;</a:t>
+              <a:t> display: inline-block;</a:t>
             </a:r>
           </a:p>
           <a:p>
@@ -6086,11 +6338,18 @@
           </a:p>
           <a:p>
             <a:r>
-              <a:rPr lang="en-US" sz="1600" dirty="0" smtClean="0">
-                <a:latin typeface="Courier New"/>
-                <a:cs typeface="Courier New"/>
-              </a:rPr>
-              <a:t>h2 {</a:t>
+              <a:rPr lang="en-US" sz="1600" dirty="0" err="1" smtClean="0">
+                <a:latin typeface="Courier New"/>
+                <a:cs typeface="Courier New"/>
+              </a:rPr>
+              <a:t>nav</a:t>
+            </a:r>
+            <a:r>
+              <a:rPr lang="en-US" sz="1600" dirty="0" smtClean="0">
+                <a:latin typeface="Courier New"/>
+                <a:cs typeface="Courier New"/>
+              </a:rPr>
+              <a:t> a {</a:t>
             </a:r>
           </a:p>
           <a:p>
@@ -6106,26 +6365,38 @@
                 <a:latin typeface="Courier New"/>
                 <a:cs typeface="Courier New"/>
               </a:rPr>
-              <a:t> font-size: 150%;</a:t>
+              <a:t> display: inline-block;</a:t>
+            </a:r>
+          </a:p>
+          <a:p>
+            <a:r>
+              <a:rPr lang="en-US" sz="1600" dirty="0">
+                <a:latin typeface="Courier New"/>
+                <a:cs typeface="Courier New"/>
+              </a:rPr>
+              <a:t> </a:t>
+            </a:r>
+            <a:r>
+              <a:rPr lang="en-US" sz="1600" dirty="0" smtClean="0">
+                <a:latin typeface="Courier New"/>
+                <a:cs typeface="Courier New"/>
+              </a:rPr>
+              <a:t> padding: 1em;</a:t>
+            </a:r>
+          </a:p>
+          <a:p>
+            <a:r>
+              <a:rPr lang="en-US" sz="1600" dirty="0">
+                <a:latin typeface="Courier New"/>
+                <a:cs typeface="Courier New"/>
+              </a:rPr>
+              <a:t>}</a:t>
             </a:r>
             <a:endParaRPr lang="en-US" sz="1600" dirty="0" smtClean="0">
               <a:latin typeface="Courier New"/>
               <a:cs typeface="Courier New"/>
             </a:endParaRPr>
           </a:p>
-          <a:p>
-            <a:r>
-              <a:rPr lang="en-US" sz="1600" dirty="0">
-                <a:latin typeface="Courier New"/>
-                <a:cs typeface="Courier New"/>
-              </a:rPr>
-              <a:t>}</a:t>
-            </a:r>
-            <a:endParaRPr lang="en-US" sz="1600" dirty="0" smtClean="0">
-              <a:latin typeface="Courier New"/>
-              <a:cs typeface="Courier New"/>
-            </a:endParaRPr>
-          </a:p>
         </p:txBody>
       </p:sp>
       <p:sp>
@@ -6161,7 +6432,7 @@
     </p:spTree>
     <p:extLst>
       <p:ext uri="{BB962C8B-B14F-4D97-AF65-F5344CB8AC3E}">
-        <p14:creationId xmlns:p14="http://schemas.microsoft.com/office/powerpoint/2010/main" val="206012275"/>
+        <p14:creationId xmlns:p14="http://schemas.microsoft.com/office/powerpoint/2010/main" val="3342147257"/>
       </p:ext>
     </p:extLst>
   </p:cSld>
@@ -6247,7 +6518,7 @@
             <a:pPr algn="ctr"/>
             <a:r>
               <a:rPr lang="en-US" sz="2400" dirty="0" smtClean="0"/>
-              <a:t>Functions and Expressions</a:t>
+              <a:t>Rule Inheritance</a:t>
             </a:r>
           </a:p>
         </p:txBody>
@@ -6260,8 +6531,8 @@
         </p:nvSpPr>
         <p:spPr>
           <a:xfrm>
-            <a:off x="89116" y="2866862"/>
-            <a:ext cx="8607431" cy="3539430"/>
+            <a:off x="89117" y="2866862"/>
+            <a:ext cx="4485667" cy="3539430"/>
           </a:xfrm>
           <a:prstGeom prst="rect">
             <a:avLst/>
@@ -6283,16 +6554,120 @@
                 <a:latin typeface="Courier New"/>
                 <a:cs typeface="Courier New"/>
               </a:rPr>
-              <a:t>@text-color: #0E0E0E;</a:t>
-            </a:r>
-          </a:p>
-          <a:p>
-            <a:r>
-              <a:rPr lang="en-US" sz="1600" dirty="0" smtClean="0">
-                <a:latin typeface="Courier New"/>
-                <a:cs typeface="Courier New"/>
-              </a:rPr>
-              <a:t>@shade-color: #FFE873;</a:t>
+              <a:t>.headings {</a:t>
+            </a:r>
+          </a:p>
+          <a:p>
+            <a:r>
+              <a:rPr lang="en-US" sz="1600" dirty="0">
+                <a:latin typeface="Courier New"/>
+                <a:cs typeface="Courier New"/>
+              </a:rPr>
+              <a:t> </a:t>
+            </a:r>
+            <a:r>
+              <a:rPr lang="en-US" sz="1600" dirty="0" smtClean="0">
+                <a:latin typeface="Courier New"/>
+                <a:cs typeface="Courier New"/>
+              </a:rPr>
+              <a:t> font-family: Arial, sans-serif;</a:t>
+            </a:r>
+          </a:p>
+          <a:p>
+            <a:r>
+              <a:rPr lang="en-US" sz="1600" dirty="0">
+                <a:latin typeface="Courier New"/>
+                <a:cs typeface="Courier New"/>
+              </a:rPr>
+              <a:t> </a:t>
+            </a:r>
+            <a:r>
+              <a:rPr lang="en-US" sz="1600" dirty="0" smtClean="0">
+                <a:latin typeface="Courier New"/>
+                <a:cs typeface="Courier New"/>
+              </a:rPr>
+              <a:t> font-weight: bold;</a:t>
+            </a:r>
+          </a:p>
+          <a:p>
+            <a:r>
+              <a:rPr lang="en-US" sz="1600" dirty="0">
+                <a:latin typeface="Courier New"/>
+                <a:cs typeface="Courier New"/>
+              </a:rPr>
+              <a:t> </a:t>
+            </a:r>
+            <a:r>
+              <a:rPr lang="en-US" sz="1600" dirty="0" smtClean="0">
+                <a:latin typeface="Courier New"/>
+                <a:cs typeface="Courier New"/>
+              </a:rPr>
+              <a:t> color: #0E0E0E;</a:t>
+            </a:r>
+          </a:p>
+          <a:p>
+            <a:r>
+              <a:rPr lang="en-US" sz="1600" dirty="0">
+                <a:latin typeface="Courier New"/>
+                <a:cs typeface="Courier New"/>
+              </a:rPr>
+              <a:t> </a:t>
+            </a:r>
+            <a:r>
+              <a:rPr lang="en-US" sz="1600" dirty="0" smtClean="0">
+                <a:latin typeface="Courier New"/>
+                <a:cs typeface="Courier New"/>
+              </a:rPr>
+              <a:t> margin-bottom: 0.5em;</a:t>
+            </a:r>
+          </a:p>
+          <a:p>
+            <a:r>
+              <a:rPr lang="en-US" sz="1600" dirty="0" smtClean="0">
+                <a:latin typeface="Courier New"/>
+                <a:cs typeface="Courier New"/>
+              </a:rPr>
+              <a:t>}</a:t>
+            </a:r>
+          </a:p>
+          <a:p>
+            <a:endParaRPr lang="en-US" sz="1600" dirty="0" smtClean="0">
+              <a:latin typeface="Courier New"/>
+              <a:cs typeface="Courier New"/>
+            </a:endParaRPr>
+          </a:p>
+          <a:p>
+            <a:r>
+              <a:rPr lang="en-US" sz="1600" dirty="0" smtClean="0">
+                <a:latin typeface="Courier New"/>
+                <a:cs typeface="Courier New"/>
+              </a:rPr>
+              <a:t>h1:extend(.headings) {</a:t>
+            </a:r>
+          </a:p>
+          <a:p>
+            <a:r>
+              <a:rPr lang="en-US" sz="1600" dirty="0">
+                <a:latin typeface="Courier New"/>
+                <a:cs typeface="Courier New"/>
+              </a:rPr>
+              <a:t> </a:t>
+            </a:r>
+            <a:r>
+              <a:rPr lang="en-US" sz="1600" dirty="0" smtClean="0">
+                <a:latin typeface="Courier New"/>
+                <a:cs typeface="Courier New"/>
+              </a:rPr>
+              <a:t> font-size: 200%;</a:t>
+            </a:r>
+          </a:p>
+          <a:p>
+            <a:r>
+              <a:rPr lang="en-US" sz="1600" dirty="0" smtClean="0">
+                <a:latin typeface="Courier New"/>
+                <a:cs typeface="Courier New"/>
+              </a:rPr>
+              <a:t>}</a:t>
             </a:r>
           </a:p>
           <a:p>
@@ -6307,7 +6682,7 @@
                 <a:latin typeface="Courier New"/>
                 <a:cs typeface="Courier New"/>
               </a:rPr>
-              <a:t>h1 {</a:t>
+              <a:t>h2:extend(.headings) {</a:t>
             </a:r>
           </a:p>
           <a:p>
@@ -6323,7 +6698,137 @@
                 <a:latin typeface="Courier New"/>
                 <a:cs typeface="Courier New"/>
               </a:rPr>
-              <a:t> color: lighten(@text-color, 10%);</a:t>
+              <a:t> font-size: 150%;</a:t>
+            </a:r>
+          </a:p>
+          <a:p>
+            <a:r>
+              <a:rPr lang="en-US" sz="1600" dirty="0">
+                <a:latin typeface="Courier New"/>
+                <a:cs typeface="Courier New"/>
+              </a:rPr>
+              <a:t>}</a:t>
+            </a:r>
+            <a:endParaRPr lang="en-US" sz="1600" dirty="0" smtClean="0">
+              <a:latin typeface="Courier New"/>
+              <a:cs typeface="Courier New"/>
+            </a:endParaRPr>
+          </a:p>
+        </p:txBody>
+      </p:sp>
+      <p:sp>
+        <p:nvSpPr>
+          <p:cNvPr id="8" name="TextBox 7"/>
+          <p:cNvSpPr txBox="1"/>
+          <p:nvPr/>
+        </p:nvSpPr>
+        <p:spPr>
+          <a:xfrm>
+            <a:off x="89117" y="2428662"/>
+            <a:ext cx="3241217" cy="369332"/>
+          </a:xfrm>
+          <a:prstGeom prst="rect">
+            <a:avLst/>
+          </a:prstGeom>
+          <a:noFill/>
+        </p:spPr>
+        <p:txBody>
+          <a:bodyPr wrap="none" rtlCol="0">
+            <a:spAutoFit/>
+          </a:bodyPr>
+          <a:lstStyle/>
+          <a:p>
+            <a:r>
+              <a:rPr lang="en-US" dirty="0" smtClean="0"/>
+              <a:t>LESS (</a:t>
+            </a:r>
+            <a:r>
+              <a:rPr lang="en-US" sz="1400" i="1" dirty="0" smtClean="0"/>
+              <a:t>SASS uses slightly different syntax</a:t>
+            </a:r>
+            <a:r>
+              <a:rPr lang="en-US" dirty="0" smtClean="0"/>
+              <a:t>)</a:t>
+            </a:r>
+            <a:endParaRPr lang="en-US" dirty="0"/>
+          </a:p>
+        </p:txBody>
+      </p:sp>
+      <p:sp>
+        <p:nvSpPr>
+          <p:cNvPr id="9" name="TextBox 8"/>
+          <p:cNvSpPr txBox="1"/>
+          <p:nvPr/>
+        </p:nvSpPr>
+        <p:spPr>
+          <a:xfrm>
+            <a:off x="4606344" y="2866862"/>
+            <a:ext cx="4485667" cy="3539430"/>
+          </a:xfrm>
+          <a:prstGeom prst="rect">
+            <a:avLst/>
+          </a:prstGeom>
+          <a:solidFill>
+            <a:schemeClr val="bg1">
+              <a:lumMod val="95000"/>
+            </a:schemeClr>
+          </a:solidFill>
+        </p:spPr>
+        <p:txBody>
+          <a:bodyPr wrap="square" rtlCol="0">
+            <a:spAutoFit/>
+          </a:bodyPr>
+          <a:lstStyle/>
+          <a:p>
+            <a:r>
+              <a:rPr lang="en-US" sz="1600" dirty="0" smtClean="0">
+                <a:latin typeface="Courier New"/>
+                <a:cs typeface="Courier New"/>
+              </a:rPr>
+              <a:t>h1, h2 {</a:t>
+            </a:r>
+          </a:p>
+          <a:p>
+            <a:r>
+              <a:rPr lang="en-US" sz="1600" dirty="0">
+                <a:latin typeface="Courier New"/>
+                <a:cs typeface="Courier New"/>
+              </a:rPr>
+              <a:t> </a:t>
+            </a:r>
+            <a:r>
+              <a:rPr lang="en-US" sz="1600" dirty="0" smtClean="0">
+                <a:latin typeface="Courier New"/>
+                <a:cs typeface="Courier New"/>
+              </a:rPr>
+              <a:t> font-family: Arial, sans-serif;</a:t>
+            </a:r>
+          </a:p>
+          <a:p>
+            <a:r>
+              <a:rPr lang="en-US" sz="1600" dirty="0" smtClean="0">
+                <a:latin typeface="Courier New"/>
+                <a:cs typeface="Courier New"/>
+              </a:rPr>
+              <a:t>  font-weight: bold;</a:t>
+            </a:r>
+          </a:p>
+          <a:p>
+            <a:r>
+              <a:rPr lang="en-US" sz="1600" dirty="0" smtClean="0">
+                <a:latin typeface="Courier New"/>
+                <a:cs typeface="Courier New"/>
+              </a:rPr>
+              <a:t>  color: #0E0E0E;</a:t>
+            </a:r>
+          </a:p>
+          <a:p>
+            <a:r>
+              <a:rPr lang="en-US" sz="1600" dirty="0" smtClean="0">
+                <a:latin typeface="Courier New"/>
+                <a:cs typeface="Courier New"/>
+              </a:rPr>
+              <a:t>  margin-bottom: 0.5em;</a:t>
             </a:r>
           </a:p>
           <a:p>
@@ -6347,16 +6852,23 @@
                 <a:latin typeface="Courier New"/>
                 <a:cs typeface="Courier New"/>
               </a:rPr>
-              <a:t>footer {</a:t>
-            </a:r>
-          </a:p>
-          <a:p>
-            <a:r>
-              <a:rPr lang="en-US" sz="1600" dirty="0" smtClean="0">
-                <a:latin typeface="Courier New"/>
-                <a:cs typeface="Courier New"/>
-              </a:rPr>
-              <a:t>  background-color: tint(@shade-color, 50%);</a:t>
+              <a:t>h1 {</a:t>
+            </a:r>
+          </a:p>
+          <a:p>
+            <a:r>
+              <a:rPr lang="en-US" sz="1600" dirty="0">
+                <a:latin typeface="Courier New"/>
+                <a:cs typeface="Courier New"/>
+              </a:rPr>
+              <a:t> </a:t>
+            </a:r>
+            <a:r>
+              <a:rPr lang="en-US" sz="1600" dirty="0" smtClean="0">
+                <a:latin typeface="Courier New"/>
+                <a:cs typeface="Courier New"/>
+              </a:rPr>
+              <a:t> font-size: 200%;</a:t>
             </a:r>
           </a:p>
           <a:p>
@@ -6369,68 +6881,61 @@
             </a:r>
           </a:p>
           <a:p>
+            <a:endParaRPr lang="en-US" sz="1600" dirty="0">
+              <a:latin typeface="Courier New"/>
+              <a:cs typeface="Courier New"/>
+            </a:endParaRPr>
+          </a:p>
+          <a:p>
+            <a:r>
+              <a:rPr lang="en-US" sz="1600" dirty="0" smtClean="0">
+                <a:latin typeface="Courier New"/>
+                <a:cs typeface="Courier New"/>
+              </a:rPr>
+              <a:t>h2 {</a:t>
+            </a:r>
+          </a:p>
+          <a:p>
+            <a:r>
+              <a:rPr lang="en-US" sz="1600" dirty="0">
+                <a:latin typeface="Courier New"/>
+                <a:cs typeface="Courier New"/>
+              </a:rPr>
+              <a:t> </a:t>
+            </a:r>
+            <a:r>
+              <a:rPr lang="en-US" sz="1600" dirty="0" smtClean="0">
+                <a:latin typeface="Courier New"/>
+                <a:cs typeface="Courier New"/>
+              </a:rPr>
+              <a:t> font-size: 150%;</a:t>
+            </a:r>
+          </a:p>
+          <a:p>
+            <a:r>
+              <a:rPr lang="en-US" sz="1600" dirty="0">
+                <a:latin typeface="Courier New"/>
+                <a:cs typeface="Courier New"/>
+              </a:rPr>
+              <a:t>}</a:t>
+            </a:r>
             <a:endParaRPr lang="en-US" sz="1600" dirty="0" smtClean="0">
               <a:latin typeface="Courier New"/>
               <a:cs typeface="Courier New"/>
             </a:endParaRPr>
           </a:p>
-          <a:p>
-            <a:r>
-              <a:rPr lang="en-US" sz="1600" dirty="0" err="1" smtClean="0">
-                <a:latin typeface="Courier New"/>
-                <a:cs typeface="Courier New"/>
-              </a:rPr>
-              <a:t>footer:hover</a:t>
-            </a:r>
-            <a:r>
-              <a:rPr lang="en-US" sz="1600" dirty="0" smtClean="0">
-                <a:latin typeface="Courier New"/>
-                <a:cs typeface="Courier New"/>
-              </a:rPr>
-              <a:t> {</a:t>
-            </a:r>
-          </a:p>
-          <a:p>
-            <a:r>
-              <a:rPr lang="en-US" sz="1600" dirty="0">
-                <a:latin typeface="Courier New"/>
-                <a:cs typeface="Courier New"/>
-              </a:rPr>
-              <a:t> </a:t>
-            </a:r>
-            <a:r>
-              <a:rPr lang="en-US" sz="1600" dirty="0" smtClean="0">
-                <a:latin typeface="Courier New"/>
-                <a:cs typeface="Courier New"/>
-              </a:rPr>
-              <a:t> background-color: @shade-color;</a:t>
-            </a:r>
-          </a:p>
-          <a:p>
-            <a:r>
-              <a:rPr lang="en-US" sz="1600" dirty="0">
-                <a:latin typeface="Courier New"/>
-                <a:cs typeface="Courier New"/>
-              </a:rPr>
-              <a:t>}</a:t>
-            </a:r>
-            <a:endParaRPr lang="en-US" sz="1600" dirty="0" smtClean="0">
-              <a:latin typeface="Courier New"/>
-              <a:cs typeface="Courier New"/>
-            </a:endParaRPr>
-          </a:p>
-        </p:txBody>
-      </p:sp>
-      <p:sp>
-        <p:nvSpPr>
-          <p:cNvPr id="8" name="TextBox 7"/>
+        </p:txBody>
+      </p:sp>
+      <p:sp>
+        <p:nvSpPr>
+          <p:cNvPr id="10" name="TextBox 9"/>
           <p:cNvSpPr txBox="1"/>
           <p:nvPr/>
         </p:nvSpPr>
         <p:spPr>
           <a:xfrm>
-            <a:off x="89117" y="2428662"/>
-            <a:ext cx="3666213" cy="369332"/>
+            <a:off x="4606344" y="2428662"/>
+            <a:ext cx="1467068" cy="369332"/>
           </a:xfrm>
           <a:prstGeom prst="rect">
             <a:avLst/>
@@ -6445,15 +6950,7 @@
           <a:p>
             <a:r>
               <a:rPr lang="en-US" dirty="0" smtClean="0"/>
-              <a:t>LESS (</a:t>
-            </a:r>
-            <a:r>
-              <a:rPr lang="en-US" sz="1400" i="1" dirty="0" smtClean="0"/>
-              <a:t>SASS has Similar Functions via Compass</a:t>
-            </a:r>
-            <a:r>
-              <a:rPr lang="en-US" dirty="0" smtClean="0"/>
-              <a:t>)</a:t>
+              <a:t>Compiled CSS</a:t>
             </a:r>
             <a:endParaRPr lang="en-US" dirty="0"/>
           </a:p>
@@ -6462,7 +6959,7 @@
     </p:spTree>
     <p:extLst>
       <p:ext uri="{BB962C8B-B14F-4D97-AF65-F5344CB8AC3E}">
-        <p14:creationId xmlns:p14="http://schemas.microsoft.com/office/powerpoint/2010/main" val="724476257"/>
+        <p14:creationId xmlns:p14="http://schemas.microsoft.com/office/powerpoint/2010/main" val="206012275"/>
       </p:ext>
     </p:extLst>
   </p:cSld>
@@ -6498,7 +6995,7 @@
         <p:spPr>
           <a:xfrm>
             <a:off x="393609" y="386210"/>
-            <a:ext cx="2277712" cy="646331"/>
+            <a:ext cx="4080188" cy="646331"/>
           </a:xfrm>
           <a:prstGeom prst="rect">
             <a:avLst/>
@@ -6515,7 +7012,7 @@
               <a:rPr lang="en-US" sz="3600" dirty="0" smtClean="0">
                 <a:latin typeface="+mj-lt"/>
               </a:rPr>
-              <a:t>LESS Usage</a:t>
+              <a:t>Language Extensions</a:t>
             </a:r>
             <a:endParaRPr lang="en-US" sz="3600" dirty="0">
               <a:latin typeface="+mj-lt"/>
@@ -6525,14 +7022,14 @@
       </p:sp>
       <p:sp>
         <p:nvSpPr>
-          <p:cNvPr id="2" name="TextBox 1"/>
+          <p:cNvPr id="5" name="TextBox 4"/>
           <p:cNvSpPr txBox="1"/>
           <p:nvPr/>
         </p:nvSpPr>
         <p:spPr>
           <a:xfrm>
-            <a:off x="861486" y="2877027"/>
-            <a:ext cx="7887048" cy="1200329"/>
+            <a:off x="1757320" y="1552856"/>
+            <a:ext cx="5629361" cy="461665"/>
           </a:xfrm>
           <a:prstGeom prst="rect">
             <a:avLst/>
@@ -6545,154 +7042,193 @@
           </a:bodyPr>
           <a:lstStyle/>
           <a:p>
-            <a:r>
-              <a:rPr lang="en-US" dirty="0" smtClean="0"/>
-              <a:t>During development, use </a:t>
-            </a:r>
-            <a:r>
-              <a:rPr lang="en-US" dirty="0" err="1" smtClean="0"/>
-              <a:t>less.js</a:t>
-            </a:r>
-            <a:r>
-              <a:rPr lang="en-US" dirty="0" smtClean="0"/>
-              <a:t> to compile LESS files to CSS on the client:</a:t>
-            </a:r>
-          </a:p>
-          <a:p>
-            <a:endParaRPr lang="en-US" dirty="0" smtClean="0"/>
-          </a:p>
-          <a:p>
-            <a:r>
-              <a:rPr lang="en-US" dirty="0">
-                <a:latin typeface="Courier New"/>
-                <a:cs typeface="Courier New"/>
-              </a:rPr>
-              <a:t>	</a:t>
-            </a:r>
-            <a:r>
-              <a:rPr lang="en-US" dirty="0" smtClean="0">
-                <a:latin typeface="Courier New"/>
-                <a:cs typeface="Courier New"/>
-              </a:rPr>
-              <a:t>&lt;link </a:t>
-            </a:r>
-            <a:r>
-              <a:rPr lang="en-US" dirty="0" err="1" smtClean="0">
-                <a:latin typeface="Courier New"/>
-                <a:cs typeface="Courier New"/>
-              </a:rPr>
-              <a:t>rel</a:t>
-            </a:r>
-            <a:r>
-              <a:rPr lang="en-US" dirty="0" smtClean="0">
-                <a:latin typeface="Courier New"/>
-                <a:cs typeface="Courier New"/>
-              </a:rPr>
-              <a:t>=“</a:t>
-            </a:r>
-            <a:r>
-              <a:rPr lang="en-US" dirty="0" err="1" smtClean="0">
-                <a:latin typeface="Courier New"/>
-                <a:cs typeface="Courier New"/>
-              </a:rPr>
-              <a:t>stylesheet</a:t>
-            </a:r>
-            <a:r>
-              <a:rPr lang="en-US" dirty="0" smtClean="0">
-                <a:latin typeface="Courier New"/>
-                <a:cs typeface="Courier New"/>
-              </a:rPr>
-              <a:t>/less” </a:t>
-            </a:r>
-            <a:r>
-              <a:rPr lang="en-US" dirty="0" err="1" smtClean="0">
-                <a:latin typeface="Courier New"/>
-                <a:cs typeface="Courier New"/>
-              </a:rPr>
-              <a:t>href</a:t>
-            </a:r>
-            <a:r>
-              <a:rPr lang="en-US" dirty="0" smtClean="0">
-                <a:latin typeface="Courier New"/>
-                <a:cs typeface="Courier New"/>
-              </a:rPr>
-              <a:t>=“less/</a:t>
-            </a:r>
-            <a:r>
-              <a:rPr lang="en-US" dirty="0" err="1" smtClean="0">
-                <a:latin typeface="Courier New"/>
-                <a:cs typeface="Courier New"/>
-              </a:rPr>
-              <a:t>styles.less</a:t>
-            </a:r>
-            <a:r>
-              <a:rPr lang="en-US" dirty="0" smtClean="0">
-                <a:latin typeface="Courier New"/>
-                <a:cs typeface="Courier New"/>
-              </a:rPr>
-              <a:t>”&gt;</a:t>
-            </a:r>
-          </a:p>
-          <a:p>
-            <a:r>
-              <a:rPr lang="en-US" dirty="0">
-                <a:latin typeface="Courier New"/>
-                <a:cs typeface="Courier New"/>
-              </a:rPr>
-              <a:t>	</a:t>
-            </a:r>
-            <a:r>
-              <a:rPr lang="en-US" dirty="0" smtClean="0">
-                <a:latin typeface="Courier New"/>
-                <a:cs typeface="Courier New"/>
-              </a:rPr>
-              <a:t>&lt;script </a:t>
-            </a:r>
-            <a:r>
-              <a:rPr lang="en-US" dirty="0" err="1" smtClean="0">
-                <a:latin typeface="Courier New"/>
-                <a:cs typeface="Courier New"/>
-              </a:rPr>
-              <a:t>src</a:t>
-            </a:r>
-            <a:r>
-              <a:rPr lang="en-US" dirty="0" smtClean="0">
-                <a:latin typeface="Courier New"/>
-                <a:cs typeface="Courier New"/>
-              </a:rPr>
-              <a:t>=“lib/</a:t>
-            </a:r>
-            <a:r>
-              <a:rPr lang="en-US" dirty="0" err="1" smtClean="0">
-                <a:latin typeface="Courier New"/>
-                <a:cs typeface="Courier New"/>
-              </a:rPr>
-              <a:t>less.js</a:t>
-            </a:r>
-            <a:r>
-              <a:rPr lang="en-US" dirty="0" smtClean="0">
-                <a:latin typeface="Courier New"/>
-                <a:cs typeface="Courier New"/>
-              </a:rPr>
-              <a:t>”&gt;</a:t>
-            </a:r>
-            <a:endParaRPr lang="en-US" dirty="0">
+            <a:pPr algn="ctr"/>
+            <a:r>
+              <a:rPr lang="en-US" sz="2400" dirty="0" smtClean="0"/>
+              <a:t>Functions and Expressions</a:t>
+            </a:r>
+          </a:p>
+        </p:txBody>
+      </p:sp>
+      <p:sp>
+        <p:nvSpPr>
+          <p:cNvPr id="3" name="TextBox 2"/>
+          <p:cNvSpPr txBox="1"/>
+          <p:nvPr/>
+        </p:nvSpPr>
+        <p:spPr>
+          <a:xfrm>
+            <a:off x="89116" y="2866862"/>
+            <a:ext cx="8607431" cy="3539430"/>
+          </a:xfrm>
+          <a:prstGeom prst="rect">
+            <a:avLst/>
+          </a:prstGeom>
+          <a:solidFill>
+            <a:schemeClr val="bg1">
+              <a:lumMod val="85000"/>
+            </a:schemeClr>
+          </a:solidFill>
+        </p:spPr>
+        <p:txBody>
+          <a:bodyPr wrap="square" rtlCol="0">
+            <a:spAutoFit/>
+          </a:bodyPr>
+          <a:lstStyle/>
+          <a:p>
+            <a:r>
+              <a:rPr lang="en-US" sz="1600" dirty="0" smtClean="0">
+                <a:latin typeface="Courier New"/>
+                <a:cs typeface="Courier New"/>
+              </a:rPr>
+              <a:t>@text-color: #0E0E0E;</a:t>
+            </a:r>
+          </a:p>
+          <a:p>
+            <a:r>
+              <a:rPr lang="en-US" sz="1600" dirty="0" smtClean="0">
+                <a:latin typeface="Courier New"/>
+                <a:cs typeface="Courier New"/>
+              </a:rPr>
+              <a:t>@shade-color: #FFE873;</a:t>
+            </a:r>
+          </a:p>
+          <a:p>
+            <a:endParaRPr lang="en-US" sz="1600" dirty="0">
               <a:latin typeface="Courier New"/>
               <a:cs typeface="Courier New"/>
             </a:endParaRPr>
           </a:p>
-        </p:txBody>
-      </p:sp>
-      <p:sp>
-        <p:nvSpPr>
-          <p:cNvPr id="7" name="TextBox 6"/>
+          <a:p>
+            <a:r>
+              <a:rPr lang="en-US" sz="1600" dirty="0" smtClean="0">
+                <a:latin typeface="Courier New"/>
+                <a:cs typeface="Courier New"/>
+              </a:rPr>
+              <a:t>h1 {</a:t>
+            </a:r>
+          </a:p>
+          <a:p>
+            <a:r>
+              <a:rPr lang="en-US" sz="1600" dirty="0">
+                <a:latin typeface="Courier New"/>
+                <a:cs typeface="Courier New"/>
+              </a:rPr>
+              <a:t> </a:t>
+            </a:r>
+            <a:r>
+              <a:rPr lang="en-US" sz="1600" dirty="0" smtClean="0">
+                <a:latin typeface="Courier New"/>
+                <a:cs typeface="Courier New"/>
+              </a:rPr>
+              <a:t> color: lighten(@text-color, 10%);</a:t>
+            </a:r>
+          </a:p>
+          <a:p>
+            <a:r>
+              <a:rPr lang="en-US" sz="1600" dirty="0" smtClean="0">
+                <a:latin typeface="Courier New"/>
+                <a:cs typeface="Courier New"/>
+              </a:rPr>
+              <a:t>}</a:t>
+            </a:r>
+          </a:p>
+          <a:p>
+            <a:endParaRPr lang="en-US" sz="1600" dirty="0">
+              <a:latin typeface="Courier New"/>
+              <a:cs typeface="Courier New"/>
+            </a:endParaRPr>
+          </a:p>
+          <a:p>
+            <a:r>
+              <a:rPr lang="en-US" sz="1600" dirty="0" smtClean="0">
+                <a:latin typeface="Courier New"/>
+                <a:cs typeface="Courier New"/>
+              </a:rPr>
+              <a:t>footer {</a:t>
+            </a:r>
+          </a:p>
+          <a:p>
+            <a:r>
+              <a:rPr lang="en-US" sz="1600" dirty="0" smtClean="0">
+                <a:latin typeface="Courier New"/>
+                <a:cs typeface="Courier New"/>
+              </a:rPr>
+              <a:t>  background-color: tint(@shade-color, 50%);</a:t>
+            </a:r>
+          </a:p>
+          <a:p>
+            <a:r>
+              <a:rPr lang="en-US" sz="1600" dirty="0" smtClean="0">
+                <a:latin typeface="Courier New"/>
+                <a:cs typeface="Courier New"/>
+              </a:rPr>
+              <a:t>}</a:t>
+            </a:r>
+          </a:p>
+          <a:p>
+            <a:endParaRPr lang="en-US" sz="1600" dirty="0" smtClean="0">
+              <a:latin typeface="Courier New"/>
+              <a:cs typeface="Courier New"/>
+            </a:endParaRPr>
+          </a:p>
+          <a:p>
+            <a:r>
+              <a:rPr lang="en-US" sz="1600" dirty="0" err="1" smtClean="0">
+                <a:latin typeface="Courier New"/>
+                <a:cs typeface="Courier New"/>
+              </a:rPr>
+              <a:t>footer:hover</a:t>
+            </a:r>
+            <a:r>
+              <a:rPr lang="en-US" sz="1600" dirty="0" smtClean="0">
+                <a:latin typeface="Courier New"/>
+                <a:cs typeface="Courier New"/>
+              </a:rPr>
+              <a:t> {</a:t>
+            </a:r>
+          </a:p>
+          <a:p>
+            <a:r>
+              <a:rPr lang="en-US" sz="1600" dirty="0">
+                <a:latin typeface="Courier New"/>
+                <a:cs typeface="Courier New"/>
+              </a:rPr>
+              <a:t> </a:t>
+            </a:r>
+            <a:r>
+              <a:rPr lang="en-US" sz="1600" dirty="0" smtClean="0">
+                <a:latin typeface="Courier New"/>
+                <a:cs typeface="Courier New"/>
+              </a:rPr>
+              <a:t> background-color: @shade-color;</a:t>
+            </a:r>
+          </a:p>
+          <a:p>
+            <a:r>
+              <a:rPr lang="en-US" sz="1600" dirty="0">
+                <a:latin typeface="Courier New"/>
+                <a:cs typeface="Courier New"/>
+              </a:rPr>
+              <a:t>}</a:t>
+            </a:r>
+            <a:endParaRPr lang="en-US" sz="1600" dirty="0" smtClean="0">
+              <a:latin typeface="Courier New"/>
+              <a:cs typeface="Courier New"/>
+            </a:endParaRPr>
+          </a:p>
+        </p:txBody>
+      </p:sp>
+      <p:sp>
+        <p:nvSpPr>
+          <p:cNvPr id="8" name="TextBox 7"/>
           <p:cNvSpPr txBox="1"/>
           <p:nvPr/>
         </p:nvSpPr>
         <p:spPr>
           <a:xfrm>
-            <a:off x="861486" y="4616067"/>
-            <a:ext cx="7887048" cy="923330"/>
+            <a:off x="89117" y="2428662"/>
+            <a:ext cx="3666213" cy="369332"/>
           </a:xfrm>
           <a:prstGeom prst="rect">
             <a:avLst/>
@@ -6700,173 +7236,31 @@
           <a:noFill/>
         </p:spPr>
         <p:txBody>
-          <a:bodyPr wrap="square" rtlCol="0">
+          <a:bodyPr wrap="none" rtlCol="0">
             <a:spAutoFit/>
           </a:bodyPr>
           <a:lstStyle/>
           <a:p>
             <a:r>
               <a:rPr lang="en-US" dirty="0" smtClean="0"/>
-              <a:t>For production, use command-line compiler to make final CSS file and link to that:</a:t>
-            </a:r>
-          </a:p>
-          <a:p>
-            <a:endParaRPr lang="en-US" dirty="0" smtClean="0"/>
-          </a:p>
-          <a:p>
-            <a:r>
-              <a:rPr lang="en-US" dirty="0">
-                <a:latin typeface="Courier New"/>
-                <a:cs typeface="Courier New"/>
-              </a:rPr>
-              <a:t>	</a:t>
-            </a:r>
-            <a:r>
-              <a:rPr lang="en-US" dirty="0" err="1" smtClean="0">
-                <a:latin typeface="Courier New"/>
-                <a:cs typeface="Courier New"/>
-              </a:rPr>
-              <a:t>lessc</a:t>
-            </a:r>
-            <a:r>
-              <a:rPr lang="en-US" dirty="0" smtClean="0">
-                <a:latin typeface="Courier New"/>
-                <a:cs typeface="Courier New"/>
-              </a:rPr>
-              <a:t> less/</a:t>
-            </a:r>
-            <a:r>
-              <a:rPr lang="en-US" dirty="0" err="1" smtClean="0">
-                <a:latin typeface="Courier New"/>
-                <a:cs typeface="Courier New"/>
-              </a:rPr>
-              <a:t>styles.less</a:t>
-            </a:r>
-            <a:r>
-              <a:rPr lang="en-US" dirty="0" smtClean="0">
-                <a:latin typeface="Courier New"/>
-                <a:cs typeface="Courier New"/>
-              </a:rPr>
-              <a:t> &gt; </a:t>
-            </a:r>
-            <a:r>
-              <a:rPr lang="en-US" dirty="0" err="1" smtClean="0">
-                <a:latin typeface="Courier New"/>
-                <a:cs typeface="Courier New"/>
-              </a:rPr>
-              <a:t>css</a:t>
-            </a:r>
-            <a:r>
-              <a:rPr lang="en-US" dirty="0" smtClean="0">
-                <a:latin typeface="Courier New"/>
-                <a:cs typeface="Courier New"/>
-              </a:rPr>
-              <a:t>/</a:t>
-            </a:r>
-            <a:r>
-              <a:rPr lang="en-US" dirty="0" err="1" smtClean="0">
-                <a:latin typeface="Courier New"/>
-                <a:cs typeface="Courier New"/>
-              </a:rPr>
-              <a:t>styles.css</a:t>
-            </a:r>
-            <a:endParaRPr lang="en-US" dirty="0">
-              <a:latin typeface="Courier New"/>
-              <a:cs typeface="Courier New"/>
-            </a:endParaRPr>
-          </a:p>
-        </p:txBody>
-      </p:sp>
-      <p:sp>
-        <p:nvSpPr>
-          <p:cNvPr id="9" name="TextBox 8"/>
-          <p:cNvSpPr txBox="1"/>
-          <p:nvPr/>
-        </p:nvSpPr>
-        <p:spPr>
-          <a:xfrm>
-            <a:off x="861486" y="1414986"/>
-            <a:ext cx="7887048" cy="923330"/>
-          </a:xfrm>
-          <a:prstGeom prst="rect">
-            <a:avLst/>
-          </a:prstGeom>
-          <a:noFill/>
-        </p:spPr>
-        <p:txBody>
-          <a:bodyPr wrap="square" rtlCol="0">
-            <a:spAutoFit/>
-          </a:bodyPr>
-          <a:lstStyle/>
-          <a:p>
+              <a:t>LESS (</a:t>
+            </a:r>
+            <a:r>
+              <a:rPr lang="en-US" sz="1400" i="1" dirty="0" smtClean="0"/>
+              <a:t>SASS has Similar Functions via Compass</a:t>
+            </a:r>
             <a:r>
               <a:rPr lang="en-US" dirty="0" smtClean="0"/>
-              <a:t>Install LESS using Package Manager that comes with </a:t>
-            </a:r>
-            <a:r>
-              <a:rPr lang="en-US" dirty="0" err="1" smtClean="0">
-                <a:hlinkClick r:id="rId2"/>
-              </a:rPr>
-              <a:t>Node.js</a:t>
-            </a:r>
-            <a:r>
-              <a:rPr lang="en-US" dirty="0" smtClean="0"/>
-              <a:t>:</a:t>
-            </a:r>
-          </a:p>
-          <a:p>
-            <a:endParaRPr lang="en-US" dirty="0" smtClean="0"/>
-          </a:p>
-          <a:p>
-            <a:r>
-              <a:rPr lang="en-US" dirty="0"/>
-              <a:t>	</a:t>
-            </a:r>
-            <a:r>
-              <a:rPr lang="en-US" dirty="0" err="1" smtClean="0">
-                <a:latin typeface="Courier New"/>
-                <a:cs typeface="Courier New"/>
-              </a:rPr>
-              <a:t>npm</a:t>
-            </a:r>
-            <a:r>
-              <a:rPr lang="en-US" dirty="0" smtClean="0">
-                <a:latin typeface="Courier New"/>
-                <a:cs typeface="Courier New"/>
-              </a:rPr>
-              <a:t> install -g less</a:t>
-            </a:r>
-          </a:p>
-        </p:txBody>
-      </p:sp>
-      <p:pic>
-        <p:nvPicPr>
-          <p:cNvPr id="10" name="Picture 9"/>
-          <p:cNvPicPr>
-            <a:picLocks noChangeAspect="1"/>
-          </p:cNvPicPr>
-          <p:nvPr/>
-        </p:nvPicPr>
-        <p:blipFill>
-          <a:blip r:embed="rId3"/>
-          <a:stretch>
-            <a:fillRect/>
-          </a:stretch>
-        </p:blipFill>
-        <p:spPr>
-          <a:xfrm>
-            <a:off x="6988430" y="243851"/>
-            <a:ext cx="1937647" cy="788690"/>
-          </a:xfrm>
-          <a:prstGeom prst="rect">
-            <a:avLst/>
-          </a:prstGeom>
-        </p:spPr>
-      </p:pic>
+              <a:t>)</a:t>
+            </a:r>
+            <a:endParaRPr lang="en-US" dirty="0"/>
+          </a:p>
+        </p:txBody>
+      </p:sp>
     </p:spTree>
     <p:extLst>
       <p:ext uri="{BB962C8B-B14F-4D97-AF65-F5344CB8AC3E}">
-        <p14:creationId xmlns:p14="http://schemas.microsoft.com/office/powerpoint/2010/main" val="724969565"/>
+        <p14:creationId xmlns:p14="http://schemas.microsoft.com/office/powerpoint/2010/main" val="724476257"/>
       </p:ext>
     </p:extLst>
   </p:cSld>

</xml_diff>